<commit_message>
all-slides.pdf code.zip numpy.pdf numpy.pptx optimization.pdf optimization.pptx
</commit_message>
<xml_diff>
--- a/ipsa/slides/numpy.pptx
+++ b/ipsa/slides/numpy.pptx
@@ -146,6 +146,14 @@
 </p:presentation>
 </file>
 
+<file path=ppt/revisionInfo.xml><?xml version="1.0" encoding="utf-8"?>
+<p1510:revInfo xmlns:a="http://schemas.openxmlformats.org/drawingml/2006/main" xmlns:r="http://schemas.openxmlformats.org/officeDocument/2006/relationships" xmlns:p1510="http://schemas.microsoft.com/office/powerpoint/2015/10/main">
+  <p1510:revLst>
+    <p1510:client id="{E52E23E9-4768-40CE-B370-48443915BC4B}" v="7" dt="2025-03-26T08:12:11.989"/>
+  </p1510:revLst>
+</p1510:revInfo>
+</file>
+
 <file path=ppt/changesInfos/changesInfo1.xml><?xml version="1.0" encoding="utf-8"?>
 <pc:chgInfo xmlns:a="http://schemas.openxmlformats.org/drawingml/2006/main" xmlns:r="http://schemas.openxmlformats.org/officeDocument/2006/relationships" xmlns:ac="http://schemas.microsoft.com/office/drawing/2013/main/command" xmlns:pc="http://schemas.microsoft.com/office/powerpoint/2013/main/command">
   <pc:docChgLst>
@@ -161,14 +169,6 @@
           <pc:docMk/>
           <pc:sldMk cId="3157069365" sldId="740"/>
         </pc:sldMkLst>
-        <pc:spChg chg="mod">
-          <ac:chgData name="Gerth Stølting Brodal" userId="04ef4784-6591-4f86-a140-f5c3b108582a" providerId="ADAL" clId="{0BAB94BD-0E9F-4ADC-9293-77F5DC9D0D68}" dt="2024-04-08T07:50:28.309" v="42" actId="20577"/>
-          <ac:spMkLst>
-            <pc:docMk/>
-            <pc:sldMk cId="3157069365" sldId="740"/>
-            <ac:spMk id="3" creationId="{00000000-0000-0000-0000-000000000000}"/>
-          </ac:spMkLst>
-        </pc:spChg>
       </pc:sldChg>
       <pc:sldChg chg="modNotesTx">
         <pc:chgData name="Gerth Stølting Brodal" userId="04ef4784-6591-4f86-a140-f5c3b108582a" providerId="ADAL" clId="{0BAB94BD-0E9F-4ADC-9293-77F5DC9D0D68}" dt="2024-04-08T07:17:49.620" v="41" actId="20577"/>
@@ -183,14 +183,6 @@
           <pc:docMk/>
           <pc:sldMk cId="2510596143" sldId="755"/>
         </pc:sldMkLst>
-        <pc:graphicFrameChg chg="mod modGraphic">
-          <ac:chgData name="Gerth Stølting Brodal" userId="04ef4784-6591-4f86-a140-f5c3b108582a" providerId="ADAL" clId="{0BAB94BD-0E9F-4ADC-9293-77F5DC9D0D68}" dt="2024-04-08T12:25:42.513" v="60" actId="20577"/>
-          <ac:graphicFrameMkLst>
-            <pc:docMk/>
-            <pc:sldMk cId="2510596143" sldId="755"/>
-            <ac:graphicFrameMk id="4" creationId="{00000000-0000-0000-0000-000000000000}"/>
-          </ac:graphicFrameMkLst>
-        </pc:graphicFrameChg>
       </pc:sldChg>
     </pc:docChg>
   </pc:docChgLst>
@@ -207,14 +199,6 @@
           <pc:docMk/>
           <pc:sldMk cId="1557432263" sldId="751"/>
         </pc:sldMkLst>
-        <pc:spChg chg="mod">
-          <ac:chgData name="Gerth Stølting Brodal" userId="04ef4784-6591-4f86-a140-f5c3b108582a" providerId="ADAL" clId="{F316340A-942C-45D6-9D7E-5900E7876E8F}" dt="2023-03-29T13:04:07.364" v="187" actId="20577"/>
-          <ac:spMkLst>
-            <pc:docMk/>
-            <pc:sldMk cId="1557432263" sldId="751"/>
-            <ac:spMk id="4" creationId="{00000000-0000-0000-0000-000000000000}"/>
-          </ac:spMkLst>
-        </pc:spChg>
       </pc:sldChg>
       <pc:sldChg chg="modSp mod">
         <pc:chgData name="Gerth Stølting Brodal" userId="04ef4784-6591-4f86-a140-f5c3b108582a" providerId="ADAL" clId="{F316340A-942C-45D6-9D7E-5900E7876E8F}" dt="2023-04-12T07:51:50.733" v="197" actId="20577"/>
@@ -222,46 +206,6 @@
           <pc:docMk/>
           <pc:sldMk cId="4115646034" sldId="753"/>
         </pc:sldMkLst>
-        <pc:spChg chg="mod">
-          <ac:chgData name="Gerth Stølting Brodal" userId="04ef4784-6591-4f86-a140-f5c3b108582a" providerId="ADAL" clId="{F316340A-942C-45D6-9D7E-5900E7876E8F}" dt="2023-03-29T10:36:49.113" v="71" actId="1037"/>
-          <ac:spMkLst>
-            <pc:docMk/>
-            <pc:sldMk cId="4115646034" sldId="753"/>
-            <ac:spMk id="5" creationId="{00000000-0000-0000-0000-000000000000}"/>
-          </ac:spMkLst>
-        </pc:spChg>
-        <pc:spChg chg="mod">
-          <ac:chgData name="Gerth Stølting Brodal" userId="04ef4784-6591-4f86-a140-f5c3b108582a" providerId="ADAL" clId="{F316340A-942C-45D6-9D7E-5900E7876E8F}" dt="2023-03-29T10:39:58.718" v="77" actId="113"/>
-          <ac:spMkLst>
-            <pc:docMk/>
-            <pc:sldMk cId="4115646034" sldId="753"/>
-            <ac:spMk id="7" creationId="{00000000-0000-0000-0000-000000000000}"/>
-          </ac:spMkLst>
-        </pc:spChg>
-        <pc:graphicFrameChg chg="modGraphic">
-          <ac:chgData name="Gerth Stølting Brodal" userId="04ef4784-6591-4f86-a140-f5c3b108582a" providerId="ADAL" clId="{F316340A-942C-45D6-9D7E-5900E7876E8F}" dt="2023-04-12T07:51:50.733" v="197" actId="20577"/>
-          <ac:graphicFrameMkLst>
-            <pc:docMk/>
-            <pc:sldMk cId="4115646034" sldId="753"/>
-            <ac:graphicFrameMk id="4" creationId="{00000000-0000-0000-0000-000000000000}"/>
-          </ac:graphicFrameMkLst>
-        </pc:graphicFrameChg>
-        <pc:picChg chg="mod">
-          <ac:chgData name="Gerth Stølting Brodal" userId="04ef4784-6591-4f86-a140-f5c3b108582a" providerId="ADAL" clId="{F316340A-942C-45D6-9D7E-5900E7876E8F}" dt="2023-03-29T10:36:49.113" v="71" actId="1037"/>
-          <ac:picMkLst>
-            <pc:docMk/>
-            <pc:sldMk cId="4115646034" sldId="753"/>
-            <ac:picMk id="6" creationId="{00000000-0000-0000-0000-000000000000}"/>
-          </ac:picMkLst>
-        </pc:picChg>
-        <pc:picChg chg="mod">
-          <ac:chgData name="Gerth Stølting Brodal" userId="04ef4784-6591-4f86-a140-f5c3b108582a" providerId="ADAL" clId="{F316340A-942C-45D6-9D7E-5900E7876E8F}" dt="2023-03-29T10:36:39.507" v="57" actId="1076"/>
-          <ac:picMkLst>
-            <pc:docMk/>
-            <pc:sldMk cId="4115646034" sldId="753"/>
-            <ac:picMk id="8" creationId="{00000000-0000-0000-0000-000000000000}"/>
-          </ac:picMkLst>
-        </pc:picChg>
       </pc:sldChg>
       <pc:sldChg chg="addSp modSp mod modNotesTx">
         <pc:chgData name="Gerth Stølting Brodal" userId="04ef4784-6591-4f86-a140-f5c3b108582a" providerId="ADAL" clId="{F316340A-942C-45D6-9D7E-5900E7876E8F}" dt="2023-03-29T10:43:20.610" v="94" actId="1035"/>
@@ -269,22 +213,6 @@
           <pc:docMk/>
           <pc:sldMk cId="822157407" sldId="754"/>
         </pc:sldMkLst>
-        <pc:graphicFrameChg chg="mod modGraphic">
-          <ac:chgData name="Gerth Stølting Brodal" userId="04ef4784-6591-4f86-a140-f5c3b108582a" providerId="ADAL" clId="{F316340A-942C-45D6-9D7E-5900E7876E8F}" dt="2023-03-29T10:42:50.271" v="90"/>
-          <ac:graphicFrameMkLst>
-            <pc:docMk/>
-            <pc:sldMk cId="822157407" sldId="754"/>
-            <ac:graphicFrameMk id="4" creationId="{00000000-0000-0000-0000-000000000000}"/>
-          </ac:graphicFrameMkLst>
-        </pc:graphicFrameChg>
-        <pc:picChg chg="add mod">
-          <ac:chgData name="Gerth Stølting Brodal" userId="04ef4784-6591-4f86-a140-f5c3b108582a" providerId="ADAL" clId="{F316340A-942C-45D6-9D7E-5900E7876E8F}" dt="2023-03-29T10:43:20.610" v="94" actId="1035"/>
-          <ac:picMkLst>
-            <pc:docMk/>
-            <pc:sldMk cId="822157407" sldId="754"/>
-            <ac:picMk id="3" creationId="{71193D85-B494-3907-983F-971117A48141}"/>
-          </ac:picMkLst>
-        </pc:picChg>
       </pc:sldChg>
       <pc:sldChg chg="modSp mod">
         <pc:chgData name="Gerth Stølting Brodal" userId="04ef4784-6591-4f86-a140-f5c3b108582a" providerId="ADAL" clId="{F316340A-942C-45D6-9D7E-5900E7876E8F}" dt="2023-03-29T10:49:44.643" v="95" actId="20577"/>
@@ -292,14 +220,6 @@
           <pc:docMk/>
           <pc:sldMk cId="601737075" sldId="757"/>
         </pc:sldMkLst>
-        <pc:graphicFrameChg chg="modGraphic">
-          <ac:chgData name="Gerth Stølting Brodal" userId="04ef4784-6591-4f86-a140-f5c3b108582a" providerId="ADAL" clId="{F316340A-942C-45D6-9D7E-5900E7876E8F}" dt="2023-03-29T10:49:44.643" v="95" actId="20577"/>
-          <ac:graphicFrameMkLst>
-            <pc:docMk/>
-            <pc:sldMk cId="601737075" sldId="757"/>
-            <ac:graphicFrameMk id="4" creationId="{00000000-0000-0000-0000-000000000000}"/>
-          </ac:graphicFrameMkLst>
-        </pc:graphicFrameChg>
       </pc:sldChg>
       <pc:sldChg chg="modSp mod modNotesTx">
         <pc:chgData name="Gerth Stølting Brodal" userId="04ef4784-6591-4f86-a140-f5c3b108582a" providerId="ADAL" clId="{F316340A-942C-45D6-9D7E-5900E7876E8F}" dt="2023-04-12T10:58:33.252" v="666" actId="20577"/>
@@ -307,14 +227,6 @@
           <pc:docMk/>
           <pc:sldMk cId="1886750958" sldId="758"/>
         </pc:sldMkLst>
-        <pc:graphicFrameChg chg="modGraphic">
-          <ac:chgData name="Gerth Stølting Brodal" userId="04ef4784-6591-4f86-a140-f5c3b108582a" providerId="ADAL" clId="{F316340A-942C-45D6-9D7E-5900E7876E8F}" dt="2023-04-12T10:55:30.991" v="511" actId="2161"/>
-          <ac:graphicFrameMkLst>
-            <pc:docMk/>
-            <pc:sldMk cId="1886750958" sldId="758"/>
-            <ac:graphicFrameMk id="4" creationId="{00000000-0000-0000-0000-000000000000}"/>
-          </ac:graphicFrameMkLst>
-        </pc:graphicFrameChg>
       </pc:sldChg>
       <pc:sldChg chg="modSp mod">
         <pc:chgData name="Gerth Stølting Brodal" userId="04ef4784-6591-4f86-a140-f5c3b108582a" providerId="ADAL" clId="{F316340A-942C-45D6-9D7E-5900E7876E8F}" dt="2023-03-29T10:51:34.765" v="97" actId="1076"/>
@@ -322,22 +234,6 @@
           <pc:docMk/>
           <pc:sldMk cId="2008844095" sldId="763"/>
         </pc:sldMkLst>
-        <pc:spChg chg="mod">
-          <ac:chgData name="Gerth Stølting Brodal" userId="04ef4784-6591-4f86-a140-f5c3b108582a" providerId="ADAL" clId="{F316340A-942C-45D6-9D7E-5900E7876E8F}" dt="2023-03-29T10:51:20.113" v="96" actId="14100"/>
-          <ac:spMkLst>
-            <pc:docMk/>
-            <pc:sldMk cId="2008844095" sldId="763"/>
-            <ac:spMk id="5" creationId="{00000000-0000-0000-0000-000000000000}"/>
-          </ac:spMkLst>
-        </pc:spChg>
-        <pc:picChg chg="mod">
-          <ac:chgData name="Gerth Stølting Brodal" userId="04ef4784-6591-4f86-a140-f5c3b108582a" providerId="ADAL" clId="{F316340A-942C-45D6-9D7E-5900E7876E8F}" dt="2023-03-29T10:51:34.765" v="97" actId="1076"/>
-          <ac:picMkLst>
-            <pc:docMk/>
-            <pc:sldMk cId="2008844095" sldId="763"/>
-            <ac:picMk id="6" creationId="{00000000-0000-0000-0000-000000000000}"/>
-          </ac:picMkLst>
-        </pc:picChg>
       </pc:sldChg>
       <pc:sldChg chg="modNotesTx">
         <pc:chgData name="Gerth Stølting Brodal" userId="04ef4784-6591-4f86-a140-f5c3b108582a" providerId="ADAL" clId="{F316340A-942C-45D6-9D7E-5900E7876E8F}" dt="2023-03-29T11:02:33.279" v="169" actId="113"/>
@@ -352,78 +248,6 @@
           <pc:docMk/>
           <pc:sldMk cId="3441406672" sldId="769"/>
         </pc:sldMkLst>
-        <pc:graphicFrameChg chg="modGraphic">
-          <ac:chgData name="Gerth Stølting Brodal" userId="04ef4784-6591-4f86-a140-f5c3b108582a" providerId="ADAL" clId="{F316340A-942C-45D6-9D7E-5900E7876E8F}" dt="2023-04-12T10:42:11.709" v="509" actId="5793"/>
-          <ac:graphicFrameMkLst>
-            <pc:docMk/>
-            <pc:sldMk cId="3441406672" sldId="769"/>
-            <ac:graphicFrameMk id="4" creationId="{00000000-0000-0000-0000-000000000000}"/>
-          </ac:graphicFrameMkLst>
-        </pc:graphicFrameChg>
-        <pc:picChg chg="add mod">
-          <ac:chgData name="Gerth Stølting Brodal" userId="04ef4784-6591-4f86-a140-f5c3b108582a" providerId="ADAL" clId="{F316340A-942C-45D6-9D7E-5900E7876E8F}" dt="2023-04-12T10:38:46.267" v="499" actId="1038"/>
-          <ac:picMkLst>
-            <pc:docMk/>
-            <pc:sldMk cId="3441406672" sldId="769"/>
-            <ac:picMk id="2" creationId="{868D558B-CB5C-7358-81C4-F89F0C390AB6}"/>
-          </ac:picMkLst>
-        </pc:picChg>
-        <pc:picChg chg="add mod">
-          <ac:chgData name="Gerth Stølting Brodal" userId="04ef4784-6591-4f86-a140-f5c3b108582a" providerId="ADAL" clId="{F316340A-942C-45D6-9D7E-5900E7876E8F}" dt="2023-04-12T10:38:46.267" v="499" actId="1038"/>
-          <ac:picMkLst>
-            <pc:docMk/>
-            <pc:sldMk cId="3441406672" sldId="769"/>
-            <ac:picMk id="3" creationId="{54A360F1-9E79-437F-563D-1AB4F2FF4366}"/>
-          </ac:picMkLst>
-        </pc:picChg>
-        <pc:picChg chg="add mod">
-          <ac:chgData name="Gerth Stølting Brodal" userId="04ef4784-6591-4f86-a140-f5c3b108582a" providerId="ADAL" clId="{F316340A-942C-45D6-9D7E-5900E7876E8F}" dt="2023-04-12T10:38:46.267" v="499" actId="1038"/>
-          <ac:picMkLst>
-            <pc:docMk/>
-            <pc:sldMk cId="3441406672" sldId="769"/>
-            <ac:picMk id="5" creationId="{8F9F3E11-280A-D180-A5C2-DD65A03754B6}"/>
-          </ac:picMkLst>
-        </pc:picChg>
-        <pc:picChg chg="del">
-          <ac:chgData name="Gerth Stølting Brodal" userId="04ef4784-6591-4f86-a140-f5c3b108582a" providerId="ADAL" clId="{F316340A-942C-45D6-9D7E-5900E7876E8F}" dt="2023-04-12T10:38:37.958" v="473" actId="478"/>
-          <ac:picMkLst>
-            <pc:docMk/>
-            <pc:sldMk cId="3441406672" sldId="769"/>
-            <ac:picMk id="10" creationId="{00000000-0000-0000-0000-000000000000}"/>
-          </ac:picMkLst>
-        </pc:picChg>
-        <pc:picChg chg="del">
-          <ac:chgData name="Gerth Stølting Brodal" userId="04ef4784-6591-4f86-a140-f5c3b108582a" providerId="ADAL" clId="{F316340A-942C-45D6-9D7E-5900E7876E8F}" dt="2023-04-12T10:38:37.958" v="473" actId="478"/>
-          <ac:picMkLst>
-            <pc:docMk/>
-            <pc:sldMk cId="3441406672" sldId="769"/>
-            <ac:picMk id="11" creationId="{00000000-0000-0000-0000-000000000000}"/>
-          </ac:picMkLst>
-        </pc:picChg>
-        <pc:picChg chg="del">
-          <ac:chgData name="Gerth Stølting Brodal" userId="04ef4784-6591-4f86-a140-f5c3b108582a" providerId="ADAL" clId="{F316340A-942C-45D6-9D7E-5900E7876E8F}" dt="2023-04-12T10:38:37.958" v="473" actId="478"/>
-          <ac:picMkLst>
-            <pc:docMk/>
-            <pc:sldMk cId="3441406672" sldId="769"/>
-            <ac:picMk id="12" creationId="{00000000-0000-0000-0000-000000000000}"/>
-          </ac:picMkLst>
-        </pc:picChg>
-        <pc:picChg chg="del mod">
-          <ac:chgData name="Gerth Stølting Brodal" userId="04ef4784-6591-4f86-a140-f5c3b108582a" providerId="ADAL" clId="{F316340A-942C-45D6-9D7E-5900E7876E8F}" dt="2023-04-12T10:38:37.958" v="473" actId="478"/>
-          <ac:picMkLst>
-            <pc:docMk/>
-            <pc:sldMk cId="3441406672" sldId="769"/>
-            <ac:picMk id="13" creationId="{00000000-0000-0000-0000-000000000000}"/>
-          </ac:picMkLst>
-        </pc:picChg>
-        <pc:picChg chg="add mod">
-          <ac:chgData name="Gerth Stølting Brodal" userId="04ef4784-6591-4f86-a140-f5c3b108582a" providerId="ADAL" clId="{F316340A-942C-45D6-9D7E-5900E7876E8F}" dt="2023-04-12T10:38:46.267" v="499" actId="1038"/>
-          <ac:picMkLst>
-            <pc:docMk/>
-            <pc:sldMk cId="3441406672" sldId="769"/>
-            <ac:picMk id="15" creationId="{A7596384-E6A7-5312-84B2-3623373007A7}"/>
-          </ac:picMkLst>
-        </pc:picChg>
       </pc:sldChg>
       <pc:sldChg chg="addSp delSp modSp add mod modNotesTx">
         <pc:chgData name="Gerth Stølting Brodal" userId="04ef4784-6591-4f86-a140-f5c3b108582a" providerId="ADAL" clId="{F316340A-942C-45D6-9D7E-5900E7876E8F}" dt="2023-04-12T10:36:44.142" v="463" actId="1076"/>
@@ -431,70 +255,6 @@
           <pc:docMk/>
           <pc:sldMk cId="1808197162" sldId="775"/>
         </pc:sldMkLst>
-        <pc:spChg chg="mod">
-          <ac:chgData name="Gerth Stølting Brodal" userId="04ef4784-6591-4f86-a140-f5c3b108582a" providerId="ADAL" clId="{F316340A-942C-45D6-9D7E-5900E7876E8F}" dt="2023-04-12T10:29:29.327" v="399" actId="1076"/>
-          <ac:spMkLst>
-            <pc:docMk/>
-            <pc:sldMk cId="1808197162" sldId="775"/>
-            <ac:spMk id="2" creationId="{00000000-0000-0000-0000-000000000000}"/>
-          </ac:spMkLst>
-        </pc:spChg>
-        <pc:spChg chg="del">
-          <ac:chgData name="Gerth Stølting Brodal" userId="04ef4784-6591-4f86-a140-f5c3b108582a" providerId="ADAL" clId="{F316340A-942C-45D6-9D7E-5900E7876E8F}" dt="2023-04-12T10:29:09.105" v="398" actId="478"/>
-          <ac:spMkLst>
-            <pc:docMk/>
-            <pc:sldMk cId="1808197162" sldId="775"/>
-            <ac:spMk id="5" creationId="{00000000-0000-0000-0000-000000000000}"/>
-          </ac:spMkLst>
-        </pc:spChg>
-        <pc:spChg chg="add del mod">
-          <ac:chgData name="Gerth Stølting Brodal" userId="04ef4784-6591-4f86-a140-f5c3b108582a" providerId="ADAL" clId="{F316340A-942C-45D6-9D7E-5900E7876E8F}" dt="2023-04-12T10:34:42.617" v="405" actId="22"/>
-          <ac:spMkLst>
-            <pc:docMk/>
-            <pc:sldMk cId="1808197162" sldId="775"/>
-            <ac:spMk id="9" creationId="{8781FCF3-2DC1-EF12-6727-570C54C4CA5F}"/>
-          </ac:spMkLst>
-        </pc:spChg>
-        <pc:spChg chg="add mod">
-          <ac:chgData name="Gerth Stølting Brodal" userId="04ef4784-6591-4f86-a140-f5c3b108582a" providerId="ADAL" clId="{F316340A-942C-45D6-9D7E-5900E7876E8F}" dt="2023-04-12T10:35:46.925" v="461" actId="6549"/>
-          <ac:spMkLst>
-            <pc:docMk/>
-            <pc:sldMk cId="1808197162" sldId="775"/>
-            <ac:spMk id="10" creationId="{40C16040-C9A5-A366-CE73-A03CC8D4C027}"/>
-          </ac:spMkLst>
-        </pc:spChg>
-        <pc:graphicFrameChg chg="mod modGraphic">
-          <ac:chgData name="Gerth Stølting Brodal" userId="04ef4784-6591-4f86-a140-f5c3b108582a" providerId="ADAL" clId="{F316340A-942C-45D6-9D7E-5900E7876E8F}" dt="2023-04-12T10:36:36.044" v="462" actId="1076"/>
-          <ac:graphicFrameMkLst>
-            <pc:docMk/>
-            <pc:sldMk cId="1808197162" sldId="775"/>
-            <ac:graphicFrameMk id="4" creationId="{00000000-0000-0000-0000-000000000000}"/>
-          </ac:graphicFrameMkLst>
-        </pc:graphicFrameChg>
-        <pc:picChg chg="del">
-          <ac:chgData name="Gerth Stølting Brodal" userId="04ef4784-6591-4f86-a140-f5c3b108582a" providerId="ADAL" clId="{F316340A-942C-45D6-9D7E-5900E7876E8F}" dt="2023-04-12T10:29:09.105" v="398" actId="478"/>
-          <ac:picMkLst>
-            <pc:docMk/>
-            <pc:sldMk cId="1808197162" sldId="775"/>
-            <ac:picMk id="6" creationId="{00000000-0000-0000-0000-000000000000}"/>
-          </ac:picMkLst>
-        </pc:picChg>
-        <pc:picChg chg="del">
-          <ac:chgData name="Gerth Stølting Brodal" userId="04ef4784-6591-4f86-a140-f5c3b108582a" providerId="ADAL" clId="{F316340A-942C-45D6-9D7E-5900E7876E8F}" dt="2023-04-12T10:26:35.299" v="262" actId="478"/>
-          <ac:picMkLst>
-            <pc:docMk/>
-            <pc:sldMk cId="1808197162" sldId="775"/>
-            <ac:picMk id="8" creationId="{00000000-0000-0000-0000-000000000000}"/>
-          </ac:picMkLst>
-        </pc:picChg>
-        <pc:picChg chg="add mod">
-          <ac:chgData name="Gerth Stølting Brodal" userId="04ef4784-6591-4f86-a140-f5c3b108582a" providerId="ADAL" clId="{F316340A-942C-45D6-9D7E-5900E7876E8F}" dt="2023-04-12T10:36:44.142" v="463" actId="1076"/>
-          <ac:picMkLst>
-            <pc:docMk/>
-            <pc:sldMk cId="1808197162" sldId="775"/>
-            <ac:picMk id="11" creationId="{28095352-3BFA-56A0-BE47-AAC9F26B1166}"/>
-          </ac:picMkLst>
-        </pc:picChg>
       </pc:sldChg>
       <pc:sldChg chg="new del">
         <pc:chgData name="Gerth Stølting Brodal" userId="04ef4784-6591-4f86-a140-f5c3b108582a" providerId="ADAL" clId="{F316340A-942C-45D6-9D7E-5900E7876E8F}" dt="2023-04-12T10:28:04.560" v="360" actId="680"/>
@@ -509,14 +269,76 @@
           <pc:docMk/>
           <pc:sldMk cId="3389015899" sldId="776"/>
         </pc:sldMkLst>
-        <pc:spChg chg="del mod">
-          <ac:chgData name="Gerth Stølting Brodal" userId="04ef4784-6591-4f86-a140-f5c3b108582a" providerId="ADAL" clId="{F316340A-942C-45D6-9D7E-5900E7876E8F}" dt="2023-04-12T10:34:52.799" v="410" actId="21"/>
+      </pc:sldChg>
+    </pc:docChg>
+  </pc:docChgLst>
+  <pc:docChgLst>
+    <pc:chgData name="Gerth Stølting Brodal" userId="04ef4784-6591-4f86-a140-f5c3b108582a" providerId="ADAL" clId="{E52E23E9-4768-40CE-B370-48443915BC4B}"/>
+    <pc:docChg chg="undo custSel modSld">
+      <pc:chgData name="Gerth Stølting Brodal" userId="04ef4784-6591-4f86-a140-f5c3b108582a" providerId="ADAL" clId="{E52E23E9-4768-40CE-B370-48443915BC4B}" dt="2025-03-26T08:12:40.448" v="196" actId="1035"/>
+      <pc:docMkLst>
+        <pc:docMk/>
+      </pc:docMkLst>
+      <pc:sldChg chg="addSp modSp mod">
+        <pc:chgData name="Gerth Stølting Brodal" userId="04ef4784-6591-4f86-a140-f5c3b108582a" providerId="ADAL" clId="{E52E23E9-4768-40CE-B370-48443915BC4B}" dt="2025-03-26T07:50:23.260" v="81" actId="1038"/>
+        <pc:sldMkLst>
+          <pc:docMk/>
+          <pc:sldMk cId="4115646034" sldId="753"/>
+        </pc:sldMkLst>
+        <pc:spChg chg="add mod">
+          <ac:chgData name="Gerth Stølting Brodal" userId="04ef4784-6591-4f86-a140-f5c3b108582a" providerId="ADAL" clId="{E52E23E9-4768-40CE-B370-48443915BC4B}" dt="2025-03-26T07:50:23.260" v="81" actId="1038"/>
           <ac:spMkLst>
             <pc:docMk/>
-            <pc:sldMk cId="3389015899" sldId="776"/>
-            <ac:spMk id="3" creationId="{7EEA2963-1F94-6200-4743-A3C0D7A6EC6D}"/>
+            <pc:sldMk cId="4115646034" sldId="753"/>
+            <ac:spMk id="9" creationId="{CF633ABE-04BB-BEA3-2AB1-AB1DF2823887}"/>
           </ac:spMkLst>
         </pc:spChg>
+        <pc:graphicFrameChg chg="modGraphic">
+          <ac:chgData name="Gerth Stølting Brodal" userId="04ef4784-6591-4f86-a140-f5c3b108582a" providerId="ADAL" clId="{E52E23E9-4768-40CE-B370-48443915BC4B}" dt="2025-03-26T07:49:43.108" v="7" actId="20577"/>
+          <ac:graphicFrameMkLst>
+            <pc:docMk/>
+            <pc:sldMk cId="4115646034" sldId="753"/>
+            <ac:graphicFrameMk id="4" creationId="{00000000-0000-0000-0000-000000000000}"/>
+          </ac:graphicFrameMkLst>
+        </pc:graphicFrameChg>
+        <pc:picChg chg="add mod">
+          <ac:chgData name="Gerth Stølting Brodal" userId="04ef4784-6591-4f86-a140-f5c3b108582a" providerId="ADAL" clId="{E52E23E9-4768-40CE-B370-48443915BC4B}" dt="2025-03-26T07:49:54.588" v="9" actId="1076"/>
+          <ac:picMkLst>
+            <pc:docMk/>
+            <pc:sldMk cId="4115646034" sldId="753"/>
+            <ac:picMk id="3" creationId="{DC2D2D41-C5E8-9710-8570-8CC2097A8D39}"/>
+          </ac:picMkLst>
+        </pc:picChg>
+      </pc:sldChg>
+      <pc:sldChg chg="modSp mod">
+        <pc:chgData name="Gerth Stølting Brodal" userId="04ef4784-6591-4f86-a140-f5c3b108582a" providerId="ADAL" clId="{E52E23E9-4768-40CE-B370-48443915BC4B}" dt="2025-03-26T08:12:40.448" v="196" actId="1035"/>
+        <pc:sldMkLst>
+          <pc:docMk/>
+          <pc:sldMk cId="3441406672" sldId="769"/>
+        </pc:sldMkLst>
+        <pc:graphicFrameChg chg="mod modGraphic">
+          <ac:chgData name="Gerth Stølting Brodal" userId="04ef4784-6591-4f86-a140-f5c3b108582a" providerId="ADAL" clId="{E52E23E9-4768-40CE-B370-48443915BC4B}" dt="2025-03-26T08:12:40.448" v="196" actId="1035"/>
+          <ac:graphicFrameMkLst>
+            <pc:docMk/>
+            <pc:sldMk cId="3441406672" sldId="769"/>
+            <ac:graphicFrameMk id="9" creationId="{00000000-0000-0000-0000-000000000000}"/>
+          </ac:graphicFrameMkLst>
+        </pc:graphicFrameChg>
+      </pc:sldChg>
+      <pc:sldChg chg="modSp mod modNotesTx">
+        <pc:chgData name="Gerth Stølting Brodal" userId="04ef4784-6591-4f86-a140-f5c3b108582a" providerId="ADAL" clId="{E52E23E9-4768-40CE-B370-48443915BC4B}" dt="2025-03-26T07:57:50.004" v="152" actId="20577"/>
+        <pc:sldMkLst>
+          <pc:docMk/>
+          <pc:sldMk cId="1808197162" sldId="775"/>
+        </pc:sldMkLst>
+        <pc:graphicFrameChg chg="mod modGraphic">
+          <ac:chgData name="Gerth Stølting Brodal" userId="04ef4784-6591-4f86-a140-f5c3b108582a" providerId="ADAL" clId="{E52E23E9-4768-40CE-B370-48443915BC4B}" dt="2025-03-26T07:56:22.326" v="88" actId="20577"/>
+          <ac:graphicFrameMkLst>
+            <pc:docMk/>
+            <pc:sldMk cId="1808197162" sldId="775"/>
+            <ac:graphicFrameMk id="4" creationId="{00000000-0000-0000-0000-000000000000}"/>
+          </ac:graphicFrameMkLst>
+        </pc:graphicFrameChg>
       </pc:sldChg>
     </pc:docChg>
   </pc:docChgLst>
@@ -533,14 +355,6 @@
           <pc:docMk/>
           <pc:sldMk cId="1023447693" sldId="739"/>
         </pc:sldMkLst>
-        <pc:spChg chg="mod">
-          <ac:chgData name="Gerth Stølting Brodal" userId="04ef4784-6591-4f86-a140-f5c3b108582a" providerId="ADAL" clId="{6582DE44-CBB2-4155-94EA-6873D72B1ACF}" dt="2022-03-18T14:01:45.390" v="24" actId="947"/>
-          <ac:spMkLst>
-            <pc:docMk/>
-            <pc:sldMk cId="1023447693" sldId="739"/>
-            <ac:spMk id="3" creationId="{00000000-0000-0000-0000-000000000000}"/>
-          </ac:spMkLst>
-        </pc:spChg>
       </pc:sldChg>
       <pc:sldChg chg="modSp mod">
         <pc:chgData name="Gerth Stølting Brodal" userId="04ef4784-6591-4f86-a140-f5c3b108582a" providerId="ADAL" clId="{6582DE44-CBB2-4155-94EA-6873D72B1ACF}" dt="2022-03-18T14:06:01.428" v="41" actId="1076"/>
@@ -548,22 +362,6 @@
           <pc:docMk/>
           <pc:sldMk cId="4197135765" sldId="749"/>
         </pc:sldMkLst>
-        <pc:graphicFrameChg chg="mod modGraphic">
-          <ac:chgData name="Gerth Stølting Brodal" userId="04ef4784-6591-4f86-a140-f5c3b108582a" providerId="ADAL" clId="{6582DE44-CBB2-4155-94EA-6873D72B1ACF}" dt="2022-03-18T14:06:01.428" v="41" actId="1076"/>
-          <ac:graphicFrameMkLst>
-            <pc:docMk/>
-            <pc:sldMk cId="4197135765" sldId="749"/>
-            <ac:graphicFrameMk id="4" creationId="{00000000-0000-0000-0000-000000000000}"/>
-          </ac:graphicFrameMkLst>
-        </pc:graphicFrameChg>
-        <pc:graphicFrameChg chg="mod modGraphic">
-          <ac:chgData name="Gerth Stølting Brodal" userId="04ef4784-6591-4f86-a140-f5c3b108582a" providerId="ADAL" clId="{6582DE44-CBB2-4155-94EA-6873D72B1ACF}" dt="2022-03-18T14:06:01.428" v="41" actId="1076"/>
-          <ac:graphicFrameMkLst>
-            <pc:docMk/>
-            <pc:sldMk cId="4197135765" sldId="749"/>
-            <ac:graphicFrameMk id="5" creationId="{00000000-0000-0000-0000-000000000000}"/>
-          </ac:graphicFrameMkLst>
-        </pc:graphicFrameChg>
       </pc:sldChg>
       <pc:sldChg chg="modSp mod modNotesTx">
         <pc:chgData name="Gerth Stølting Brodal" userId="04ef4784-6591-4f86-a140-f5c3b108582a" providerId="ADAL" clId="{6582DE44-CBB2-4155-94EA-6873D72B1ACF}" dt="2022-03-30T10:55:57.907" v="3060" actId="313"/>
@@ -571,14 +369,6 @@
           <pc:docMk/>
           <pc:sldMk cId="1557432263" sldId="751"/>
         </pc:sldMkLst>
-        <pc:graphicFrameChg chg="modGraphic">
-          <ac:chgData name="Gerth Stølting Brodal" userId="04ef4784-6591-4f86-a140-f5c3b108582a" providerId="ADAL" clId="{6582DE44-CBB2-4155-94EA-6873D72B1ACF}" dt="2022-03-18T14:03:18.460" v="32" actId="14100"/>
-          <ac:graphicFrameMkLst>
-            <pc:docMk/>
-            <pc:sldMk cId="1557432263" sldId="751"/>
-            <ac:graphicFrameMk id="5" creationId="{00000000-0000-0000-0000-000000000000}"/>
-          </ac:graphicFrameMkLst>
-        </pc:graphicFrameChg>
       </pc:sldChg>
       <pc:sldChg chg="modSp mod">
         <pc:chgData name="Gerth Stølting Brodal" userId="04ef4784-6591-4f86-a140-f5c3b108582a" providerId="ADAL" clId="{6582DE44-CBB2-4155-94EA-6873D72B1ACF}" dt="2022-03-30T11:00:03.488" v="3061" actId="207"/>
@@ -586,14 +376,6 @@
           <pc:docMk/>
           <pc:sldMk cId="822157407" sldId="754"/>
         </pc:sldMkLst>
-        <pc:graphicFrameChg chg="modGraphic">
-          <ac:chgData name="Gerth Stølting Brodal" userId="04ef4784-6591-4f86-a140-f5c3b108582a" providerId="ADAL" clId="{6582DE44-CBB2-4155-94EA-6873D72B1ACF}" dt="2022-03-30T11:00:03.488" v="3061" actId="207"/>
-          <ac:graphicFrameMkLst>
-            <pc:docMk/>
-            <pc:sldMk cId="822157407" sldId="754"/>
-            <ac:graphicFrameMk id="4" creationId="{00000000-0000-0000-0000-000000000000}"/>
-          </ac:graphicFrameMkLst>
-        </pc:graphicFrameChg>
       </pc:sldChg>
       <pc:sldChg chg="modNotesTx">
         <pc:chgData name="Gerth Stølting Brodal" userId="04ef4784-6591-4f86-a140-f5c3b108582a" providerId="ADAL" clId="{6582DE44-CBB2-4155-94EA-6873D72B1ACF}" dt="2022-03-30T11:06:02.793" v="3087" actId="20577"/>
@@ -608,14 +390,6 @@
           <pc:docMk/>
           <pc:sldMk cId="1297860505" sldId="756"/>
         </pc:sldMkLst>
-        <pc:graphicFrameChg chg="modGraphic">
-          <ac:chgData name="Gerth Stølting Brodal" userId="04ef4784-6591-4f86-a140-f5c3b108582a" providerId="ADAL" clId="{6582DE44-CBB2-4155-94EA-6873D72B1ACF}" dt="2022-03-30T11:06:50.473" v="3088" actId="207"/>
-          <ac:graphicFrameMkLst>
-            <pc:docMk/>
-            <pc:sldMk cId="1297860505" sldId="756"/>
-            <ac:graphicFrameMk id="4" creationId="{00000000-0000-0000-0000-000000000000}"/>
-          </ac:graphicFrameMkLst>
-        </pc:graphicFrameChg>
       </pc:sldChg>
       <pc:sldChg chg="modSp mod">
         <pc:chgData name="Gerth Stølting Brodal" userId="04ef4784-6591-4f86-a140-f5c3b108582a" providerId="ADAL" clId="{6582DE44-CBB2-4155-94EA-6873D72B1ACF}" dt="2022-03-30T11:10:17.428" v="3091" actId="20577"/>
@@ -623,14 +397,6 @@
           <pc:docMk/>
           <pc:sldMk cId="601737075" sldId="757"/>
         </pc:sldMkLst>
-        <pc:graphicFrameChg chg="modGraphic">
-          <ac:chgData name="Gerth Stølting Brodal" userId="04ef4784-6591-4f86-a140-f5c3b108582a" providerId="ADAL" clId="{6582DE44-CBB2-4155-94EA-6873D72B1ACF}" dt="2022-03-30T11:10:17.428" v="3091" actId="20577"/>
-          <ac:graphicFrameMkLst>
-            <pc:docMk/>
-            <pc:sldMk cId="601737075" sldId="757"/>
-            <ac:graphicFrameMk id="4" creationId="{00000000-0000-0000-0000-000000000000}"/>
-          </ac:graphicFrameMkLst>
-        </pc:graphicFrameChg>
       </pc:sldChg>
       <pc:sldChg chg="modSp mod">
         <pc:chgData name="Gerth Stølting Brodal" userId="04ef4784-6591-4f86-a140-f5c3b108582a" providerId="ADAL" clId="{6582DE44-CBB2-4155-94EA-6873D72B1ACF}" dt="2022-04-04T06:34:38.759" v="3215" actId="313"/>
@@ -638,14 +404,6 @@
           <pc:docMk/>
           <pc:sldMk cId="873157440" sldId="759"/>
         </pc:sldMkLst>
-        <pc:graphicFrameChg chg="modGraphic">
-          <ac:chgData name="Gerth Stølting Brodal" userId="04ef4784-6591-4f86-a140-f5c3b108582a" providerId="ADAL" clId="{6582DE44-CBB2-4155-94EA-6873D72B1ACF}" dt="2022-04-04T06:34:38.759" v="3215" actId="313"/>
-          <ac:graphicFrameMkLst>
-            <pc:docMk/>
-            <pc:sldMk cId="873157440" sldId="759"/>
-            <ac:graphicFrameMk id="4" creationId="{00000000-0000-0000-0000-000000000000}"/>
-          </ac:graphicFrameMkLst>
-        </pc:graphicFrameChg>
       </pc:sldChg>
       <pc:sldChg chg="modSp mod">
         <pc:chgData name="Gerth Stølting Brodal" userId="04ef4784-6591-4f86-a140-f5c3b108582a" providerId="ADAL" clId="{6582DE44-CBB2-4155-94EA-6873D72B1ACF}" dt="2022-03-30T11:08:30.948" v="3089" actId="20577"/>
@@ -653,14 +411,6 @@
           <pc:docMk/>
           <pc:sldMk cId="3620329826" sldId="762"/>
         </pc:sldMkLst>
-        <pc:graphicFrameChg chg="modGraphic">
-          <ac:chgData name="Gerth Stølting Brodal" userId="04ef4784-6591-4f86-a140-f5c3b108582a" providerId="ADAL" clId="{6582DE44-CBB2-4155-94EA-6873D72B1ACF}" dt="2022-03-30T11:08:30.948" v="3089" actId="20577"/>
-          <ac:graphicFrameMkLst>
-            <pc:docMk/>
-            <pc:sldMk cId="3620329826" sldId="762"/>
-            <ac:graphicFrameMk id="4" creationId="{00000000-0000-0000-0000-000000000000}"/>
-          </ac:graphicFrameMkLst>
-        </pc:graphicFrameChg>
       </pc:sldChg>
       <pc:sldChg chg="modNotesTx">
         <pc:chgData name="Gerth Stølting Brodal" userId="04ef4784-6591-4f86-a140-f5c3b108582a" providerId="ADAL" clId="{6582DE44-CBB2-4155-94EA-6873D72B1ACF}" dt="2022-03-30T11:29:04.128" v="3122" actId="20577"/>
@@ -675,430 +425,6 @@
           <pc:docMk/>
           <pc:sldMk cId="386054163" sldId="770"/>
         </pc:sldMkLst>
-        <pc:spChg chg="mod">
-          <ac:chgData name="Gerth Stølting Brodal" userId="04ef4784-6591-4f86-a140-f5c3b108582a" providerId="ADAL" clId="{6582DE44-CBB2-4155-94EA-6873D72B1ACF}" dt="2022-03-18T20:41:13.219" v="1741" actId="14100"/>
-          <ac:spMkLst>
-            <pc:docMk/>
-            <pc:sldMk cId="386054163" sldId="770"/>
-            <ac:spMk id="2" creationId="{00000000-0000-0000-0000-000000000000}"/>
-          </ac:spMkLst>
-        </pc:spChg>
-        <pc:spChg chg="add del">
-          <ac:chgData name="Gerth Stølting Brodal" userId="04ef4784-6591-4f86-a140-f5c3b108582a" providerId="ADAL" clId="{6582DE44-CBB2-4155-94EA-6873D72B1ACF}" dt="2022-03-18T14:16:20.237" v="140" actId="478"/>
-          <ac:spMkLst>
-            <pc:docMk/>
-            <pc:sldMk cId="386054163" sldId="770"/>
-            <ac:spMk id="3" creationId="{00000000-0000-0000-0000-000000000000}"/>
-          </ac:spMkLst>
-        </pc:spChg>
-        <pc:spChg chg="del">
-          <ac:chgData name="Gerth Stølting Brodal" userId="04ef4784-6591-4f86-a140-f5c3b108582a" providerId="ADAL" clId="{6582DE44-CBB2-4155-94EA-6873D72B1ACF}" dt="2022-03-18T14:14:46.521" v="107" actId="478"/>
-          <ac:spMkLst>
-            <pc:docMk/>
-            <pc:sldMk cId="386054163" sldId="770"/>
-            <ac:spMk id="5" creationId="{00000000-0000-0000-0000-000000000000}"/>
-          </ac:spMkLst>
-        </pc:spChg>
-        <pc:spChg chg="del">
-          <ac:chgData name="Gerth Stølting Brodal" userId="04ef4784-6591-4f86-a140-f5c3b108582a" providerId="ADAL" clId="{6582DE44-CBB2-4155-94EA-6873D72B1ACF}" dt="2022-03-18T14:11:37.383" v="71" actId="478"/>
-          <ac:spMkLst>
-            <pc:docMk/>
-            <pc:sldMk cId="386054163" sldId="770"/>
-            <ac:spMk id="6" creationId="{00000000-0000-0000-0000-000000000000}"/>
-          </ac:spMkLst>
-        </pc:spChg>
-        <pc:spChg chg="add del mod">
-          <ac:chgData name="Gerth Stølting Brodal" userId="04ef4784-6591-4f86-a140-f5c3b108582a" providerId="ADAL" clId="{6582DE44-CBB2-4155-94EA-6873D72B1ACF}" dt="2022-03-18T15:44:31.656" v="379" actId="478"/>
-          <ac:spMkLst>
-            <pc:docMk/>
-            <pc:sldMk cId="386054163" sldId="770"/>
-            <ac:spMk id="11" creationId="{05BB2982-6C93-466C-B510-94E6218A0A46}"/>
-          </ac:spMkLst>
-        </pc:spChg>
-        <pc:spChg chg="add del mod">
-          <ac:chgData name="Gerth Stølting Brodal" userId="04ef4784-6591-4f86-a140-f5c3b108582a" providerId="ADAL" clId="{6582DE44-CBB2-4155-94EA-6873D72B1ACF}" dt="2022-03-18T20:05:37.247" v="1468" actId="478"/>
-          <ac:spMkLst>
-            <pc:docMk/>
-            <pc:sldMk cId="386054163" sldId="770"/>
-            <ac:spMk id="12" creationId="{B1109C6D-502F-44F9-948E-BD54BF0DAE87}"/>
-          </ac:spMkLst>
-        </pc:spChg>
-        <pc:spChg chg="add del mod">
-          <ac:chgData name="Gerth Stølting Brodal" userId="04ef4784-6591-4f86-a140-f5c3b108582a" providerId="ADAL" clId="{6582DE44-CBB2-4155-94EA-6873D72B1ACF}" dt="2022-03-18T16:03:55.835" v="594" actId="478"/>
-          <ac:spMkLst>
-            <pc:docMk/>
-            <pc:sldMk cId="386054163" sldId="770"/>
-            <ac:spMk id="13" creationId="{AAB12527-1AD4-4434-B1D8-BC8892F5B45B}"/>
-          </ac:spMkLst>
-        </pc:spChg>
-        <pc:spChg chg="add del mod">
-          <ac:chgData name="Gerth Stølting Brodal" userId="04ef4784-6591-4f86-a140-f5c3b108582a" providerId="ADAL" clId="{6582DE44-CBB2-4155-94EA-6873D72B1ACF}" dt="2022-03-18T16:03:55.835" v="594" actId="478"/>
-          <ac:spMkLst>
-            <pc:docMk/>
-            <pc:sldMk cId="386054163" sldId="770"/>
-            <ac:spMk id="14" creationId="{60569E3F-A86B-4A7D-B3DB-F2BECAFF7E9E}"/>
-          </ac:spMkLst>
-        </pc:spChg>
-        <pc:spChg chg="add del mod topLvl">
-          <ac:chgData name="Gerth Stølting Brodal" userId="04ef4784-6591-4f86-a140-f5c3b108582a" providerId="ADAL" clId="{6582DE44-CBB2-4155-94EA-6873D72B1ACF}" dt="2022-03-18T20:05:37.247" v="1468" actId="478"/>
-          <ac:spMkLst>
-            <pc:docMk/>
-            <pc:sldMk cId="386054163" sldId="770"/>
-            <ac:spMk id="15" creationId="{A5FBE3C7-6861-40EA-A5A1-7C7AF5BAC40F}"/>
-          </ac:spMkLst>
-        </pc:spChg>
-        <pc:spChg chg="add del mod topLvl">
-          <ac:chgData name="Gerth Stølting Brodal" userId="04ef4784-6591-4f86-a140-f5c3b108582a" providerId="ADAL" clId="{6582DE44-CBB2-4155-94EA-6873D72B1ACF}" dt="2022-03-18T20:05:37.247" v="1468" actId="478"/>
-          <ac:spMkLst>
-            <pc:docMk/>
-            <pc:sldMk cId="386054163" sldId="770"/>
-            <ac:spMk id="16" creationId="{48F5A869-1EC6-461D-A908-0E37B5615E40}"/>
-          </ac:spMkLst>
-        </pc:spChg>
-        <pc:spChg chg="add del mod">
-          <ac:chgData name="Gerth Stølting Brodal" userId="04ef4784-6591-4f86-a140-f5c3b108582a" providerId="ADAL" clId="{6582DE44-CBB2-4155-94EA-6873D72B1ACF}" dt="2022-03-18T20:05:37.247" v="1468" actId="478"/>
-          <ac:spMkLst>
-            <pc:docMk/>
-            <pc:sldMk cId="386054163" sldId="770"/>
-            <ac:spMk id="17" creationId="{AFD77E79-77BF-473A-84F2-713E1E991CC7}"/>
-          </ac:spMkLst>
-        </pc:spChg>
-        <pc:spChg chg="add del mod">
-          <ac:chgData name="Gerth Stølting Brodal" userId="04ef4784-6591-4f86-a140-f5c3b108582a" providerId="ADAL" clId="{6582DE44-CBB2-4155-94EA-6873D72B1ACF}" dt="2022-03-18T15:55:34.922" v="534" actId="478"/>
-          <ac:spMkLst>
-            <pc:docMk/>
-            <pc:sldMk cId="386054163" sldId="770"/>
-            <ac:spMk id="18" creationId="{5B0A6F4B-0D7C-4E4B-8E4D-6A899F94CD0B}"/>
-          </ac:spMkLst>
-        </pc:spChg>
-        <pc:spChg chg="add del mod topLvl">
-          <ac:chgData name="Gerth Stølting Brodal" userId="04ef4784-6591-4f86-a140-f5c3b108582a" providerId="ADAL" clId="{6582DE44-CBB2-4155-94EA-6873D72B1ACF}" dt="2022-03-18T20:05:37.247" v="1468" actId="478"/>
-          <ac:spMkLst>
-            <pc:docMk/>
-            <pc:sldMk cId="386054163" sldId="770"/>
-            <ac:spMk id="19" creationId="{622EA022-1CB2-48D6-A091-13AE8B9BE8CE}"/>
-          </ac:spMkLst>
-        </pc:spChg>
-        <pc:spChg chg="add del mod topLvl">
-          <ac:chgData name="Gerth Stølting Brodal" userId="04ef4784-6591-4f86-a140-f5c3b108582a" providerId="ADAL" clId="{6582DE44-CBB2-4155-94EA-6873D72B1ACF}" dt="2022-03-18T20:05:37.247" v="1468" actId="478"/>
-          <ac:spMkLst>
-            <pc:docMk/>
-            <pc:sldMk cId="386054163" sldId="770"/>
-            <ac:spMk id="20" creationId="{7CC83A41-B101-4912-8A15-B39BFBBACE41}"/>
-          </ac:spMkLst>
-        </pc:spChg>
-        <pc:spChg chg="add del mod topLvl">
-          <ac:chgData name="Gerth Stølting Brodal" userId="04ef4784-6591-4f86-a140-f5c3b108582a" providerId="ADAL" clId="{6582DE44-CBB2-4155-94EA-6873D72B1ACF}" dt="2022-03-18T20:05:37.247" v="1468" actId="478"/>
-          <ac:spMkLst>
-            <pc:docMk/>
-            <pc:sldMk cId="386054163" sldId="770"/>
-            <ac:spMk id="21" creationId="{495B8B70-07F3-4DA3-BFB5-11D4AFCEE22B}"/>
-          </ac:spMkLst>
-        </pc:spChg>
-        <pc:spChg chg="add del mod">
-          <ac:chgData name="Gerth Stølting Brodal" userId="04ef4784-6591-4f86-a140-f5c3b108582a" providerId="ADAL" clId="{6582DE44-CBB2-4155-94EA-6873D72B1ACF}" dt="2022-03-18T20:05:37.247" v="1468" actId="478"/>
-          <ac:spMkLst>
-            <pc:docMk/>
-            <pc:sldMk cId="386054163" sldId="770"/>
-            <ac:spMk id="22" creationId="{A05C0497-E63F-4CA0-9A70-39A8612D7A87}"/>
-          </ac:spMkLst>
-        </pc:spChg>
-        <pc:spChg chg="add del mod topLvl">
-          <ac:chgData name="Gerth Stølting Brodal" userId="04ef4784-6591-4f86-a140-f5c3b108582a" providerId="ADAL" clId="{6582DE44-CBB2-4155-94EA-6873D72B1ACF}" dt="2022-03-18T20:05:39.467" v="1469" actId="478"/>
-          <ac:spMkLst>
-            <pc:docMk/>
-            <pc:sldMk cId="386054163" sldId="770"/>
-            <ac:spMk id="23" creationId="{825DB411-0624-4CB4-866C-5F4227D92A64}"/>
-          </ac:spMkLst>
-        </pc:spChg>
-        <pc:spChg chg="add del mod topLvl">
-          <ac:chgData name="Gerth Stølting Brodal" userId="04ef4784-6591-4f86-a140-f5c3b108582a" providerId="ADAL" clId="{6582DE44-CBB2-4155-94EA-6873D72B1ACF}" dt="2022-03-18T20:05:37.247" v="1468" actId="478"/>
-          <ac:spMkLst>
-            <pc:docMk/>
-            <pc:sldMk cId="386054163" sldId="770"/>
-            <ac:spMk id="27" creationId="{BDF744DC-8081-44A1-8ECF-C5E24038A569}"/>
-          </ac:spMkLst>
-        </pc:spChg>
-        <pc:spChg chg="add del mod topLvl">
-          <ac:chgData name="Gerth Stølting Brodal" userId="04ef4784-6591-4f86-a140-f5c3b108582a" providerId="ADAL" clId="{6582DE44-CBB2-4155-94EA-6873D72B1ACF}" dt="2022-03-18T20:05:37.247" v="1468" actId="478"/>
-          <ac:spMkLst>
-            <pc:docMk/>
-            <pc:sldMk cId="386054163" sldId="770"/>
-            <ac:spMk id="28" creationId="{F581D962-7C2A-44F0-A9BC-484DE52CF1CA}"/>
-          </ac:spMkLst>
-        </pc:spChg>
-        <pc:spChg chg="add mod">
-          <ac:chgData name="Gerth Stølting Brodal" userId="04ef4784-6591-4f86-a140-f5c3b108582a" providerId="ADAL" clId="{6582DE44-CBB2-4155-94EA-6873D72B1ACF}" dt="2022-03-18T16:07:14.638" v="757"/>
-          <ac:spMkLst>
-            <pc:docMk/>
-            <pc:sldMk cId="386054163" sldId="770"/>
-            <ac:spMk id="30" creationId="{54D7C720-1000-4C30-B025-578954E0B8A4}"/>
-          </ac:spMkLst>
-        </pc:spChg>
-        <pc:spChg chg="add mod">
-          <ac:chgData name="Gerth Stølting Brodal" userId="04ef4784-6591-4f86-a140-f5c3b108582a" providerId="ADAL" clId="{6582DE44-CBB2-4155-94EA-6873D72B1ACF}" dt="2022-03-18T16:07:14.638" v="757"/>
-          <ac:spMkLst>
-            <pc:docMk/>
-            <pc:sldMk cId="386054163" sldId="770"/>
-            <ac:spMk id="31" creationId="{A1702FC0-1653-4A7B-806A-547FEB8AFC22}"/>
-          </ac:spMkLst>
-        </pc:spChg>
-        <pc:spChg chg="add mod">
-          <ac:chgData name="Gerth Stølting Brodal" userId="04ef4784-6591-4f86-a140-f5c3b108582a" providerId="ADAL" clId="{6582DE44-CBB2-4155-94EA-6873D72B1ACF}" dt="2022-03-18T16:07:14.638" v="757"/>
-          <ac:spMkLst>
-            <pc:docMk/>
-            <pc:sldMk cId="386054163" sldId="770"/>
-            <ac:spMk id="32" creationId="{C682BBDC-99B9-46B3-8302-E8BF6EF90EF4}"/>
-          </ac:spMkLst>
-        </pc:spChg>
-        <pc:spChg chg="add mod">
-          <ac:chgData name="Gerth Stølting Brodal" userId="04ef4784-6591-4f86-a140-f5c3b108582a" providerId="ADAL" clId="{6582DE44-CBB2-4155-94EA-6873D72B1ACF}" dt="2022-03-18T16:07:14.638" v="757"/>
-          <ac:spMkLst>
-            <pc:docMk/>
-            <pc:sldMk cId="386054163" sldId="770"/>
-            <ac:spMk id="33" creationId="{736D00B8-8A5B-4DBE-98E9-4EB5678E56EC}"/>
-          </ac:spMkLst>
-        </pc:spChg>
-        <pc:spChg chg="add mod">
-          <ac:chgData name="Gerth Stølting Brodal" userId="04ef4784-6591-4f86-a140-f5c3b108582a" providerId="ADAL" clId="{6582DE44-CBB2-4155-94EA-6873D72B1ACF}" dt="2022-03-18T16:07:14.638" v="757"/>
-          <ac:spMkLst>
-            <pc:docMk/>
-            <pc:sldMk cId="386054163" sldId="770"/>
-            <ac:spMk id="34" creationId="{3F73D83A-7CE0-48AA-BE8E-8C42C298F2BC}"/>
-          </ac:spMkLst>
-        </pc:spChg>
-        <pc:spChg chg="add mod">
-          <ac:chgData name="Gerth Stølting Brodal" userId="04ef4784-6591-4f86-a140-f5c3b108582a" providerId="ADAL" clId="{6582DE44-CBB2-4155-94EA-6873D72B1ACF}" dt="2022-03-18T20:44:23.967" v="1770" actId="1035"/>
-          <ac:spMkLst>
-            <pc:docMk/>
-            <pc:sldMk cId="386054163" sldId="770"/>
-            <ac:spMk id="34" creationId="{83DC6ACF-8886-48DF-8791-5A52B074A78F}"/>
-          </ac:spMkLst>
-        </pc:spChg>
-        <pc:spChg chg="add mod">
-          <ac:chgData name="Gerth Stølting Brodal" userId="04ef4784-6591-4f86-a140-f5c3b108582a" providerId="ADAL" clId="{6582DE44-CBB2-4155-94EA-6873D72B1ACF}" dt="2022-03-18T20:59:44.668" v="1790" actId="6549"/>
-          <ac:spMkLst>
-            <pc:docMk/>
-            <pc:sldMk cId="386054163" sldId="770"/>
-            <ac:spMk id="35" creationId="{216172EA-9872-4357-9E2D-1677FB93A20F}"/>
-          </ac:spMkLst>
-        </pc:spChg>
-        <pc:spChg chg="add mod">
-          <ac:chgData name="Gerth Stølting Brodal" userId="04ef4784-6591-4f86-a140-f5c3b108582a" providerId="ADAL" clId="{6582DE44-CBB2-4155-94EA-6873D72B1ACF}" dt="2022-03-18T16:07:14.638" v="757"/>
-          <ac:spMkLst>
-            <pc:docMk/>
-            <pc:sldMk cId="386054163" sldId="770"/>
-            <ac:spMk id="35" creationId="{8F8EE745-A270-4029-B674-4C1CAEDFDDEA}"/>
-          </ac:spMkLst>
-        </pc:spChg>
-        <pc:spChg chg="add mod">
-          <ac:chgData name="Gerth Stølting Brodal" userId="04ef4784-6591-4f86-a140-f5c3b108582a" providerId="ADAL" clId="{6582DE44-CBB2-4155-94EA-6873D72B1ACF}" dt="2022-03-18T16:07:14.638" v="757"/>
-          <ac:spMkLst>
-            <pc:docMk/>
-            <pc:sldMk cId="386054163" sldId="770"/>
-            <ac:spMk id="36" creationId="{38884CCB-3A7F-4656-A713-56271F88716E}"/>
-          </ac:spMkLst>
-        </pc:spChg>
-        <pc:spChg chg="add mod">
-          <ac:chgData name="Gerth Stølting Brodal" userId="04ef4784-6591-4f86-a140-f5c3b108582a" providerId="ADAL" clId="{6582DE44-CBB2-4155-94EA-6873D72B1ACF}" dt="2022-03-18T16:07:14.638" v="757"/>
-          <ac:spMkLst>
-            <pc:docMk/>
-            <pc:sldMk cId="386054163" sldId="770"/>
-            <ac:spMk id="37" creationId="{3CB28499-6F29-4EF0-A0D3-C68271C29EDE}"/>
-          </ac:spMkLst>
-        </pc:spChg>
-        <pc:spChg chg="add del mod ord">
-          <ac:chgData name="Gerth Stølting Brodal" userId="04ef4784-6591-4f86-a140-f5c3b108582a" providerId="ADAL" clId="{6582DE44-CBB2-4155-94EA-6873D72B1ACF}" dt="2022-03-18T20:05:37.247" v="1468" actId="478"/>
-          <ac:spMkLst>
-            <pc:docMk/>
-            <pc:sldMk cId="386054163" sldId="770"/>
-            <ac:spMk id="39" creationId="{20D27FBC-4B6C-4909-85EB-9386F4214E90}"/>
-          </ac:spMkLst>
-        </pc:spChg>
-        <pc:spChg chg="add del mod">
-          <ac:chgData name="Gerth Stølting Brodal" userId="04ef4784-6591-4f86-a140-f5c3b108582a" providerId="ADAL" clId="{6582DE44-CBB2-4155-94EA-6873D72B1ACF}" dt="2022-03-18T20:05:37.247" v="1468" actId="478"/>
-          <ac:spMkLst>
-            <pc:docMk/>
-            <pc:sldMk cId="386054163" sldId="770"/>
-            <ac:spMk id="40" creationId="{B438CC3A-9BD8-4F7E-89A1-DFD4CF737327}"/>
-          </ac:spMkLst>
-        </pc:spChg>
-        <pc:spChg chg="add del mod">
-          <ac:chgData name="Gerth Stølting Brodal" userId="04ef4784-6591-4f86-a140-f5c3b108582a" providerId="ADAL" clId="{6582DE44-CBB2-4155-94EA-6873D72B1ACF}" dt="2022-03-18T20:05:37.247" v="1468" actId="478"/>
-          <ac:spMkLst>
-            <pc:docMk/>
-            <pc:sldMk cId="386054163" sldId="770"/>
-            <ac:spMk id="41" creationId="{2FD36CF3-BE6E-486C-A4B2-3D85C0496273}"/>
-          </ac:spMkLst>
-        </pc:spChg>
-        <pc:spChg chg="add del mod">
-          <ac:chgData name="Gerth Stølting Brodal" userId="04ef4784-6591-4f86-a140-f5c3b108582a" providerId="ADAL" clId="{6582DE44-CBB2-4155-94EA-6873D72B1ACF}" dt="2022-03-18T20:05:37.247" v="1468" actId="478"/>
-          <ac:spMkLst>
-            <pc:docMk/>
-            <pc:sldMk cId="386054163" sldId="770"/>
-            <ac:spMk id="42" creationId="{133A5FBE-7E17-4BD9-9B8F-EA205318AC3F}"/>
-          </ac:spMkLst>
-        </pc:spChg>
-        <pc:spChg chg="add del mod">
-          <ac:chgData name="Gerth Stølting Brodal" userId="04ef4784-6591-4f86-a140-f5c3b108582a" providerId="ADAL" clId="{6582DE44-CBB2-4155-94EA-6873D72B1ACF}" dt="2022-03-18T20:05:37.247" v="1468" actId="478"/>
-          <ac:spMkLst>
-            <pc:docMk/>
-            <pc:sldMk cId="386054163" sldId="770"/>
-            <ac:spMk id="43" creationId="{C4DB3934-741C-4710-BF6E-75E4B3DDF048}"/>
-          </ac:spMkLst>
-        </pc:spChg>
-        <pc:spChg chg="add del mod">
-          <ac:chgData name="Gerth Stølting Brodal" userId="04ef4784-6591-4f86-a140-f5c3b108582a" providerId="ADAL" clId="{6582DE44-CBB2-4155-94EA-6873D72B1ACF}" dt="2022-03-18T20:05:37.247" v="1468" actId="478"/>
-          <ac:spMkLst>
-            <pc:docMk/>
-            <pc:sldMk cId="386054163" sldId="770"/>
-            <ac:spMk id="44" creationId="{DA448C31-9763-4E25-9C26-8D17F393ED43}"/>
-          </ac:spMkLst>
-        </pc:spChg>
-        <pc:spChg chg="add del mod">
-          <ac:chgData name="Gerth Stølting Brodal" userId="04ef4784-6591-4f86-a140-f5c3b108582a" providerId="ADAL" clId="{6582DE44-CBB2-4155-94EA-6873D72B1ACF}" dt="2022-03-18T20:05:37.247" v="1468" actId="478"/>
-          <ac:spMkLst>
-            <pc:docMk/>
-            <pc:sldMk cId="386054163" sldId="770"/>
-            <ac:spMk id="45" creationId="{FBC4B3F9-7518-4B76-9A74-01B40D5E83D7}"/>
-          </ac:spMkLst>
-        </pc:spChg>
-        <pc:spChg chg="add del mod">
-          <ac:chgData name="Gerth Stølting Brodal" userId="04ef4784-6591-4f86-a140-f5c3b108582a" providerId="ADAL" clId="{6582DE44-CBB2-4155-94EA-6873D72B1ACF}" dt="2022-03-18T20:05:37.247" v="1468" actId="478"/>
-          <ac:spMkLst>
-            <pc:docMk/>
-            <pc:sldMk cId="386054163" sldId="770"/>
-            <ac:spMk id="46" creationId="{1DAF10F4-6BB2-4FAB-93ED-7E1FBE4D16CA}"/>
-          </ac:spMkLst>
-        </pc:spChg>
-        <pc:spChg chg="add del mod">
-          <ac:chgData name="Gerth Stølting Brodal" userId="04ef4784-6591-4f86-a140-f5c3b108582a" providerId="ADAL" clId="{6582DE44-CBB2-4155-94EA-6873D72B1ACF}" dt="2022-03-18T20:05:37.247" v="1468" actId="478"/>
-          <ac:spMkLst>
-            <pc:docMk/>
-            <pc:sldMk cId="386054163" sldId="770"/>
-            <ac:spMk id="47" creationId="{20508799-EC7C-4E0F-A2F5-4A213A030553}"/>
-          </ac:spMkLst>
-        </pc:spChg>
-        <pc:spChg chg="add del mod">
-          <ac:chgData name="Gerth Stølting Brodal" userId="04ef4784-6591-4f86-a140-f5c3b108582a" providerId="ADAL" clId="{6582DE44-CBB2-4155-94EA-6873D72B1ACF}" dt="2022-03-18T20:05:37.247" v="1468" actId="478"/>
-          <ac:spMkLst>
-            <pc:docMk/>
-            <pc:sldMk cId="386054163" sldId="770"/>
-            <ac:spMk id="48" creationId="{8F6869D5-7908-4AAB-A331-4078D852602C}"/>
-          </ac:spMkLst>
-        </pc:spChg>
-        <pc:spChg chg="add mod">
-          <ac:chgData name="Gerth Stølting Brodal" userId="04ef4784-6591-4f86-a140-f5c3b108582a" providerId="ADAL" clId="{6582DE44-CBB2-4155-94EA-6873D72B1ACF}" dt="2022-03-18T20:44:23.967" v="1770" actId="1035"/>
-          <ac:spMkLst>
-            <pc:docMk/>
-            <pc:sldMk cId="386054163" sldId="770"/>
-            <ac:spMk id="49" creationId="{27CFA618-9750-4DBB-B843-DB91CF5BB07C}"/>
-          </ac:spMkLst>
-        </pc:spChg>
-        <pc:spChg chg="add mod">
-          <ac:chgData name="Gerth Stølting Brodal" userId="04ef4784-6591-4f86-a140-f5c3b108582a" providerId="ADAL" clId="{6582DE44-CBB2-4155-94EA-6873D72B1ACF}" dt="2022-03-18T20:44:23.967" v="1770" actId="1035"/>
-          <ac:spMkLst>
-            <pc:docMk/>
-            <pc:sldMk cId="386054163" sldId="770"/>
-            <ac:spMk id="52" creationId="{B89159AD-BC7A-4565-B1DF-EC3885C162D4}"/>
-          </ac:spMkLst>
-        </pc:spChg>
-        <pc:grpChg chg="add del mod">
-          <ac:chgData name="Gerth Stølting Brodal" userId="04ef4784-6591-4f86-a140-f5c3b108582a" providerId="ADAL" clId="{6582DE44-CBB2-4155-94EA-6873D72B1ACF}" dt="2022-03-18T16:08:09.257" v="760" actId="165"/>
-          <ac:grpSpMkLst>
-            <pc:docMk/>
-            <pc:sldMk cId="386054163" sldId="770"/>
-            <ac:grpSpMk id="38" creationId="{91D2D86F-235D-4F69-ACA9-DA84DCAA0DD7}"/>
-          </ac:grpSpMkLst>
-        </pc:grpChg>
-        <pc:graphicFrameChg chg="add del mod">
-          <ac:chgData name="Gerth Stølting Brodal" userId="04ef4784-6591-4f86-a140-f5c3b108582a" providerId="ADAL" clId="{6582DE44-CBB2-4155-94EA-6873D72B1ACF}" dt="2022-03-18T14:11:54.496" v="79" actId="478"/>
-          <ac:graphicFrameMkLst>
-            <pc:docMk/>
-            <pc:sldMk cId="386054163" sldId="770"/>
-            <ac:graphicFrameMk id="4" creationId="{00000000-0000-0000-0000-000000000000}"/>
-          </ac:graphicFrameMkLst>
-        </pc:graphicFrameChg>
-        <pc:graphicFrameChg chg="add mod modGraphic">
-          <ac:chgData name="Gerth Stølting Brodal" userId="04ef4784-6591-4f86-a140-f5c3b108582a" providerId="ADAL" clId="{6582DE44-CBB2-4155-94EA-6873D72B1ACF}" dt="2022-03-18T20:56:56.556" v="1789" actId="207"/>
-          <ac:graphicFrameMkLst>
-            <pc:docMk/>
-            <pc:sldMk cId="386054163" sldId="770"/>
-            <ac:graphicFrameMk id="8" creationId="{FEFCB115-AB53-4C2D-B305-0CACDAB2540B}"/>
-          </ac:graphicFrameMkLst>
-        </pc:graphicFrameChg>
-        <pc:picChg chg="add mod">
-          <ac:chgData name="Gerth Stølting Brodal" userId="04ef4784-6591-4f86-a140-f5c3b108582a" providerId="ADAL" clId="{6582DE44-CBB2-4155-94EA-6873D72B1ACF}" dt="2022-03-19T11:23:32.085" v="3000" actId="1037"/>
-          <ac:picMkLst>
-            <pc:docMk/>
-            <pc:sldMk cId="386054163" sldId="770"/>
-            <ac:picMk id="4" creationId="{01C62DF3-A7AA-4692-8340-004ECB98DBCE}"/>
-          </ac:picMkLst>
-        </pc:picChg>
-        <pc:picChg chg="del">
-          <ac:chgData name="Gerth Stølting Brodal" userId="04ef4784-6591-4f86-a140-f5c3b108582a" providerId="ADAL" clId="{6582DE44-CBB2-4155-94EA-6873D72B1ACF}" dt="2022-03-18T14:11:39.658" v="72" actId="478"/>
-          <ac:picMkLst>
-            <pc:docMk/>
-            <pc:sldMk cId="386054163" sldId="770"/>
-            <ac:picMk id="7" creationId="{00000000-0000-0000-0000-000000000000}"/>
-          </ac:picMkLst>
-        </pc:picChg>
-        <pc:picChg chg="add del mod ord modCrop">
-          <ac:chgData name="Gerth Stølting Brodal" userId="04ef4784-6591-4f86-a140-f5c3b108582a" providerId="ADAL" clId="{6582DE44-CBB2-4155-94EA-6873D72B1ACF}" dt="2022-03-18T20:05:31.335" v="1467" actId="478"/>
-          <ac:picMkLst>
-            <pc:docMk/>
-            <pc:sldMk cId="386054163" sldId="770"/>
-            <ac:picMk id="10" creationId="{7725E3D9-1F0A-4F92-B5A7-195414FCA9A0}"/>
-          </ac:picMkLst>
-        </pc:picChg>
-        <pc:cxnChg chg="add del mod ord topLvl">
-          <ac:chgData name="Gerth Stølting Brodal" userId="04ef4784-6591-4f86-a140-f5c3b108582a" providerId="ADAL" clId="{6582DE44-CBB2-4155-94EA-6873D72B1ACF}" dt="2022-03-18T20:05:37.247" v="1468" actId="478"/>
-          <ac:cxnSpMkLst>
-            <pc:docMk/>
-            <pc:sldMk cId="386054163" sldId="770"/>
-            <ac:cxnSpMk id="25" creationId="{C1E3C627-43DE-4D5C-9428-A6C6225B2F4D}"/>
-          </ac:cxnSpMkLst>
-        </pc:cxnChg>
-        <pc:cxnChg chg="add mod">
-          <ac:chgData name="Gerth Stølting Brodal" userId="04ef4784-6591-4f86-a140-f5c3b108582a" providerId="ADAL" clId="{6582DE44-CBB2-4155-94EA-6873D72B1ACF}" dt="2022-03-18T16:07:14.638" v="757"/>
-          <ac:cxnSpMkLst>
-            <pc:docMk/>
-            <pc:sldMk cId="386054163" sldId="770"/>
-            <ac:cxnSpMk id="29" creationId="{CBACEEC4-1D80-403B-9134-38A299D6127C}"/>
-          </ac:cxnSpMkLst>
-        </pc:cxnChg>
-        <pc:cxnChg chg="add mod">
-          <ac:chgData name="Gerth Stølting Brodal" userId="04ef4784-6591-4f86-a140-f5c3b108582a" providerId="ADAL" clId="{6582DE44-CBB2-4155-94EA-6873D72B1ACF}" dt="2022-03-18T20:44:23.967" v="1770" actId="1035"/>
-          <ac:cxnSpMkLst>
-            <pc:docMk/>
-            <pc:sldMk cId="386054163" sldId="770"/>
-            <ac:cxnSpMk id="32" creationId="{7765C4BC-0DBE-4CAE-9029-78ED3968197E}"/>
-          </ac:cxnSpMkLst>
-        </pc:cxnChg>
-        <pc:cxnChg chg="add mod">
-          <ac:chgData name="Gerth Stølting Brodal" userId="04ef4784-6591-4f86-a140-f5c3b108582a" providerId="ADAL" clId="{6582DE44-CBB2-4155-94EA-6873D72B1ACF}" dt="2022-03-18T20:44:23.967" v="1770" actId="1035"/>
-          <ac:cxnSpMkLst>
-            <pc:docMk/>
-            <pc:sldMk cId="386054163" sldId="770"/>
-            <ac:cxnSpMk id="36" creationId="{F7F0AF67-EEA6-41B9-BDF4-FCC9482FF1ED}"/>
-          </ac:cxnSpMkLst>
-        </pc:cxnChg>
-        <pc:cxnChg chg="add mod">
-          <ac:chgData name="Gerth Stølting Brodal" userId="04ef4784-6591-4f86-a140-f5c3b108582a" providerId="ADAL" clId="{6582DE44-CBB2-4155-94EA-6873D72B1ACF}" dt="2022-03-18T20:44:23.967" v="1770" actId="1035"/>
-          <ac:cxnSpMkLst>
-            <pc:docMk/>
-            <pc:sldMk cId="386054163" sldId="770"/>
-            <ac:cxnSpMk id="50" creationId="{5573AF38-E2A2-4572-829E-D9383C4B8D26}"/>
-          </ac:cxnSpMkLst>
-        </pc:cxnChg>
-        <pc:cxnChg chg="add mod">
-          <ac:chgData name="Gerth Stølting Brodal" userId="04ef4784-6591-4f86-a140-f5c3b108582a" providerId="ADAL" clId="{6582DE44-CBB2-4155-94EA-6873D72B1ACF}" dt="2022-03-18T20:44:52.722" v="1772" actId="14100"/>
-          <ac:cxnSpMkLst>
-            <pc:docMk/>
-            <pc:sldMk cId="386054163" sldId="770"/>
-            <ac:cxnSpMk id="51" creationId="{07947EBA-9148-4CB5-8DF7-B9F46BC95050}"/>
-          </ac:cxnSpMkLst>
-        </pc:cxnChg>
       </pc:sldChg>
       <pc:sldChg chg="add del">
         <pc:chgData name="Gerth Stølting Brodal" userId="04ef4784-6591-4f86-a140-f5c3b108582a" providerId="ADAL" clId="{6582DE44-CBB2-4155-94EA-6873D72B1ACF}" dt="2022-03-18T14:09:39.206" v="46"/>
@@ -1113,118 +439,6 @@
           <pc:docMk/>
           <pc:sldMk cId="4024228852" sldId="771"/>
         </pc:sldMkLst>
-        <pc:spChg chg="mod">
-          <ac:chgData name="Gerth Stølting Brodal" userId="04ef4784-6591-4f86-a140-f5c3b108582a" providerId="ADAL" clId="{6582DE44-CBB2-4155-94EA-6873D72B1ACF}" dt="2022-03-29T06:09:22.607" v="3014" actId="207"/>
-          <ac:spMkLst>
-            <pc:docMk/>
-            <pc:sldMk cId="4024228852" sldId="771"/>
-            <ac:spMk id="12" creationId="{B1109C6D-502F-44F9-948E-BD54BF0DAE87}"/>
-          </ac:spMkLst>
-        </pc:spChg>
-        <pc:spChg chg="mod">
-          <ac:chgData name="Gerth Stølting Brodal" userId="04ef4784-6591-4f86-a140-f5c3b108582a" providerId="ADAL" clId="{6582DE44-CBB2-4155-94EA-6873D72B1ACF}" dt="2022-03-29T06:09:33.716" v="3017" actId="207"/>
-          <ac:spMkLst>
-            <pc:docMk/>
-            <pc:sldMk cId="4024228852" sldId="771"/>
-            <ac:spMk id="15" creationId="{A5FBE3C7-6861-40EA-A5A1-7C7AF5BAC40F}"/>
-          </ac:spMkLst>
-        </pc:spChg>
-        <pc:spChg chg="add mod ord">
-          <ac:chgData name="Gerth Stølting Brodal" userId="04ef4784-6591-4f86-a140-f5c3b108582a" providerId="ADAL" clId="{6582DE44-CBB2-4155-94EA-6873D72B1ACF}" dt="2022-03-29T06:10:08.004" v="3020" actId="207"/>
-          <ac:spMkLst>
-            <pc:docMk/>
-            <pc:sldMk cId="4024228852" sldId="771"/>
-            <ac:spMk id="30" creationId="{C6C7587D-22CD-4B73-8818-3571DB00469F}"/>
-          </ac:spMkLst>
-        </pc:spChg>
-        <pc:spChg chg="mod">
-          <ac:chgData name="Gerth Stølting Brodal" userId="04ef4784-6591-4f86-a140-f5c3b108582a" providerId="ADAL" clId="{6582DE44-CBB2-4155-94EA-6873D72B1ACF}" dt="2022-03-29T06:09:37.405" v="3018" actId="207"/>
-          <ac:spMkLst>
-            <pc:docMk/>
-            <pc:sldMk cId="4024228852" sldId="771"/>
-            <ac:spMk id="39" creationId="{20D27FBC-4B6C-4909-85EB-9386F4214E90}"/>
-          </ac:spMkLst>
-        </pc:spChg>
-        <pc:spChg chg="del">
-          <ac:chgData name="Gerth Stølting Brodal" userId="04ef4784-6591-4f86-a140-f5c3b108582a" providerId="ADAL" clId="{6582DE44-CBB2-4155-94EA-6873D72B1ACF}" dt="2022-03-19T09:12:22.733" v="1793" actId="478"/>
-          <ac:spMkLst>
-            <pc:docMk/>
-            <pc:sldMk cId="4024228852" sldId="771"/>
-            <ac:spMk id="40" creationId="{B438CC3A-9BD8-4F7E-89A1-DFD4CF737327}"/>
-          </ac:spMkLst>
-        </pc:spChg>
-        <pc:spChg chg="mod">
-          <ac:chgData name="Gerth Stølting Brodal" userId="04ef4784-6591-4f86-a140-f5c3b108582a" providerId="ADAL" clId="{6582DE44-CBB2-4155-94EA-6873D72B1ACF}" dt="2022-03-18T20:39:06.188" v="1735" actId="164"/>
-          <ac:spMkLst>
-            <pc:docMk/>
-            <pc:sldMk cId="4024228852" sldId="771"/>
-            <ac:spMk id="42" creationId="{133A5FBE-7E17-4BD9-9B8F-EA205318AC3F}"/>
-          </ac:spMkLst>
-        </pc:spChg>
-        <pc:spChg chg="mod">
-          <ac:chgData name="Gerth Stølting Brodal" userId="04ef4784-6591-4f86-a140-f5c3b108582a" providerId="ADAL" clId="{6582DE44-CBB2-4155-94EA-6873D72B1ACF}" dt="2022-03-18T20:39:06.188" v="1735" actId="164"/>
-          <ac:spMkLst>
-            <pc:docMk/>
-            <pc:sldMk cId="4024228852" sldId="771"/>
-            <ac:spMk id="43" creationId="{C4DB3934-741C-4710-BF6E-75E4B3DDF048}"/>
-          </ac:spMkLst>
-        </pc:spChg>
-        <pc:spChg chg="mod">
-          <ac:chgData name="Gerth Stølting Brodal" userId="04ef4784-6591-4f86-a140-f5c3b108582a" providerId="ADAL" clId="{6582DE44-CBB2-4155-94EA-6873D72B1ACF}" dt="2022-03-18T20:39:06.188" v="1735" actId="164"/>
-          <ac:spMkLst>
-            <pc:docMk/>
-            <pc:sldMk cId="4024228852" sldId="771"/>
-            <ac:spMk id="44" creationId="{DA448C31-9763-4E25-9C26-8D17F393ED43}"/>
-          </ac:spMkLst>
-        </pc:spChg>
-        <pc:spChg chg="mod">
-          <ac:chgData name="Gerth Stølting Brodal" userId="04ef4784-6591-4f86-a140-f5c3b108582a" providerId="ADAL" clId="{6582DE44-CBB2-4155-94EA-6873D72B1ACF}" dt="2022-03-18T20:39:06.188" v="1735" actId="164"/>
-          <ac:spMkLst>
-            <pc:docMk/>
-            <pc:sldMk cId="4024228852" sldId="771"/>
-            <ac:spMk id="45" creationId="{FBC4B3F9-7518-4B76-9A74-01B40D5E83D7}"/>
-          </ac:spMkLst>
-        </pc:spChg>
-        <pc:spChg chg="mod">
-          <ac:chgData name="Gerth Stølting Brodal" userId="04ef4784-6591-4f86-a140-f5c3b108582a" providerId="ADAL" clId="{6582DE44-CBB2-4155-94EA-6873D72B1ACF}" dt="2022-03-18T20:39:06.188" v="1735" actId="164"/>
-          <ac:spMkLst>
-            <pc:docMk/>
-            <pc:sldMk cId="4024228852" sldId="771"/>
-            <ac:spMk id="46" creationId="{1DAF10F4-6BB2-4FAB-93ED-7E1FBE4D16CA}"/>
-          </ac:spMkLst>
-        </pc:spChg>
-        <pc:spChg chg="mod">
-          <ac:chgData name="Gerth Stølting Brodal" userId="04ef4784-6591-4f86-a140-f5c3b108582a" providerId="ADAL" clId="{6582DE44-CBB2-4155-94EA-6873D72B1ACF}" dt="2022-03-18T20:39:06.188" v="1735" actId="164"/>
-          <ac:spMkLst>
-            <pc:docMk/>
-            <pc:sldMk cId="4024228852" sldId="771"/>
-            <ac:spMk id="47" creationId="{20508799-EC7C-4E0F-A2F5-4A213A030553}"/>
-          </ac:spMkLst>
-        </pc:spChg>
-        <pc:spChg chg="mod">
-          <ac:chgData name="Gerth Stølting Brodal" userId="04ef4784-6591-4f86-a140-f5c3b108582a" providerId="ADAL" clId="{6582DE44-CBB2-4155-94EA-6873D72B1ACF}" dt="2022-03-18T20:39:06.188" v="1735" actId="164"/>
-          <ac:spMkLst>
-            <pc:docMk/>
-            <pc:sldMk cId="4024228852" sldId="771"/>
-            <ac:spMk id="48" creationId="{8F6869D5-7908-4AAB-A331-4078D852602C}"/>
-          </ac:spMkLst>
-        </pc:spChg>
-        <pc:grpChg chg="add del mod">
-          <ac:chgData name="Gerth Stølting Brodal" userId="04ef4784-6591-4f86-a140-f5c3b108582a" providerId="ADAL" clId="{6582DE44-CBB2-4155-94EA-6873D72B1ACF}" dt="2022-03-18T20:39:09.995" v="1737" actId="478"/>
-          <ac:grpSpMkLst>
-            <pc:docMk/>
-            <pc:sldMk cId="4024228852" sldId="771"/>
-            <ac:grpSpMk id="3" creationId="{BB798676-DAAD-4AE1-A631-CC8A5F7A4868}"/>
-          </ac:grpSpMkLst>
-        </pc:grpChg>
-        <pc:cxnChg chg="mod">
-          <ac:chgData name="Gerth Stølting Brodal" userId="04ef4784-6591-4f86-a140-f5c3b108582a" providerId="ADAL" clId="{6582DE44-CBB2-4155-94EA-6873D72B1ACF}" dt="2022-03-29T06:09:48.336" v="3019" actId="208"/>
-          <ac:cxnSpMkLst>
-            <pc:docMk/>
-            <pc:sldMk cId="4024228852" sldId="771"/>
-            <ac:cxnSpMk id="25" creationId="{C1E3C627-43DE-4D5C-9428-A6C6225B2F4D}"/>
-          </ac:cxnSpMkLst>
-        </pc:cxnChg>
       </pc:sldChg>
       <pc:sldChg chg="new del">
         <pc:chgData name="Gerth Stølting Brodal" userId="04ef4784-6591-4f86-a140-f5c3b108582a" providerId="ADAL" clId="{6582DE44-CBB2-4155-94EA-6873D72B1ACF}" dt="2022-03-19T10:15:21.524" v="2154" actId="47"/>
@@ -1239,46 +453,6 @@
           <pc:docMk/>
           <pc:sldMk cId="3124323286" sldId="773"/>
         </pc:sldMkLst>
-        <pc:spChg chg="del">
-          <ac:chgData name="Gerth Stølting Brodal" userId="04ef4784-6591-4f86-a140-f5c3b108582a" providerId="ADAL" clId="{6582DE44-CBB2-4155-94EA-6873D72B1ACF}" dt="2022-03-19T09:15:56.990" v="1940" actId="478"/>
-          <ac:spMkLst>
-            <pc:docMk/>
-            <pc:sldMk cId="3124323286" sldId="773"/>
-            <ac:spMk id="2" creationId="{BE699651-C0A8-49C1-8619-22AECD1A17AE}"/>
-          </ac:spMkLst>
-        </pc:spChg>
-        <pc:spChg chg="del">
-          <ac:chgData name="Gerth Stølting Brodal" userId="04ef4784-6591-4f86-a140-f5c3b108582a" providerId="ADAL" clId="{6582DE44-CBB2-4155-94EA-6873D72B1ACF}" dt="2022-03-19T09:15:56.990" v="1940" actId="478"/>
-          <ac:spMkLst>
-            <pc:docMk/>
-            <pc:sldMk cId="3124323286" sldId="773"/>
-            <ac:spMk id="3" creationId="{D70EF64B-B6D4-4E30-AA82-DC1D07FE79B2}"/>
-          </ac:spMkLst>
-        </pc:spChg>
-        <pc:graphicFrameChg chg="add mod modGraphic">
-          <ac:chgData name="Gerth Stølting Brodal" userId="04ef4784-6591-4f86-a140-f5c3b108582a" providerId="ADAL" clId="{6582DE44-CBB2-4155-94EA-6873D72B1ACF}" dt="2022-03-19T11:37:53.872" v="3006" actId="5793"/>
-          <ac:graphicFrameMkLst>
-            <pc:docMk/>
-            <pc:sldMk cId="3124323286" sldId="773"/>
-            <ac:graphicFrameMk id="6" creationId="{EDC7C7C2-12C3-4BDC-AE0E-CA8F02A3F0DD}"/>
-          </ac:graphicFrameMkLst>
-        </pc:graphicFrameChg>
-        <pc:picChg chg="add mod">
-          <ac:chgData name="Gerth Stølting Brodal" userId="04ef4784-6591-4f86-a140-f5c3b108582a" providerId="ADAL" clId="{6582DE44-CBB2-4155-94EA-6873D72B1ACF}" dt="2022-03-19T09:24:56.958" v="1997" actId="1076"/>
-          <ac:picMkLst>
-            <pc:docMk/>
-            <pc:sldMk cId="3124323286" sldId="773"/>
-            <ac:picMk id="5" creationId="{D741C955-67A7-4497-B80F-75B15BBD93CD}"/>
-          </ac:picMkLst>
-        </pc:picChg>
-        <pc:picChg chg="add mod">
-          <ac:chgData name="Gerth Stølting Brodal" userId="04ef4784-6591-4f86-a140-f5c3b108582a" providerId="ADAL" clId="{6582DE44-CBB2-4155-94EA-6873D72B1ACF}" dt="2022-03-19T09:34:53.662" v="2138" actId="1076"/>
-          <ac:picMkLst>
-            <pc:docMk/>
-            <pc:sldMk cId="3124323286" sldId="773"/>
-            <ac:picMk id="7" creationId="{5BF33AA1-21CD-4329-8642-D9D48A3B34ED}"/>
-          </ac:picMkLst>
-        </pc:picChg>
       </pc:sldChg>
       <pc:sldChg chg="addSp delSp modSp add mod delAnim modAnim modNotesTx">
         <pc:chgData name="Gerth Stølting Brodal" userId="04ef4784-6591-4f86-a140-f5c3b108582a" providerId="ADAL" clId="{6582DE44-CBB2-4155-94EA-6873D72B1ACF}" dt="2022-03-19T12:30:23.438" v="3013" actId="207"/>
@@ -1286,126 +460,6 @@
           <pc:docMk/>
           <pc:sldMk cId="2720162074" sldId="774"/>
         </pc:sldMkLst>
-        <pc:spChg chg="mod">
-          <ac:chgData name="Gerth Stølting Brodal" userId="04ef4784-6591-4f86-a140-f5c3b108582a" providerId="ADAL" clId="{6582DE44-CBB2-4155-94EA-6873D72B1ACF}" dt="2022-03-19T10:16:14.547" v="2172" actId="20577"/>
-          <ac:spMkLst>
-            <pc:docMk/>
-            <pc:sldMk cId="2720162074" sldId="774"/>
-            <ac:spMk id="2" creationId="{00000000-0000-0000-0000-000000000000}"/>
-          </ac:spMkLst>
-        </pc:spChg>
-        <pc:spChg chg="add mod">
-          <ac:chgData name="Gerth Stølting Brodal" userId="04ef4784-6591-4f86-a140-f5c3b108582a" providerId="ADAL" clId="{6582DE44-CBB2-4155-94EA-6873D72B1ACF}" dt="2022-03-19T11:15:02.689" v="2835" actId="1582"/>
-          <ac:spMkLst>
-            <pc:docMk/>
-            <pc:sldMk cId="2720162074" sldId="774"/>
-            <ac:spMk id="13" creationId="{2DD0BB4C-CFE0-4F02-A4A7-44471E97919F}"/>
-          </ac:spMkLst>
-        </pc:spChg>
-        <pc:spChg chg="add del mod">
-          <ac:chgData name="Gerth Stølting Brodal" userId="04ef4784-6591-4f86-a140-f5c3b108582a" providerId="ADAL" clId="{6582DE44-CBB2-4155-94EA-6873D72B1ACF}" dt="2022-03-19T11:11:52.139" v="2813" actId="478"/>
-          <ac:spMkLst>
-            <pc:docMk/>
-            <pc:sldMk cId="2720162074" sldId="774"/>
-            <ac:spMk id="20" creationId="{9001A4E0-0BC3-4AE1-8629-DCA4E02D40B8}"/>
-          </ac:spMkLst>
-        </pc:spChg>
-        <pc:spChg chg="mod">
-          <ac:chgData name="Gerth Stølting Brodal" userId="04ef4784-6591-4f86-a140-f5c3b108582a" providerId="ADAL" clId="{6582DE44-CBB2-4155-94EA-6873D72B1ACF}" dt="2022-03-19T10:49:55.446" v="2618" actId="1036"/>
-          <ac:spMkLst>
-            <pc:docMk/>
-            <pc:sldMk cId="2720162074" sldId="774"/>
-            <ac:spMk id="34" creationId="{83DC6ACF-8886-48DF-8791-5A52B074A78F}"/>
-          </ac:spMkLst>
-        </pc:spChg>
-        <pc:spChg chg="mod">
-          <ac:chgData name="Gerth Stølting Brodal" userId="04ef4784-6591-4f86-a140-f5c3b108582a" providerId="ADAL" clId="{6582DE44-CBB2-4155-94EA-6873D72B1ACF}" dt="2022-03-19T10:49:25.185" v="2592" actId="1076"/>
-          <ac:spMkLst>
-            <pc:docMk/>
-            <pc:sldMk cId="2720162074" sldId="774"/>
-            <ac:spMk id="35" creationId="{216172EA-9872-4357-9E2D-1677FB93A20F}"/>
-          </ac:spMkLst>
-        </pc:spChg>
-        <pc:spChg chg="mod">
-          <ac:chgData name="Gerth Stølting Brodal" userId="04ef4784-6591-4f86-a140-f5c3b108582a" providerId="ADAL" clId="{6582DE44-CBB2-4155-94EA-6873D72B1ACF}" dt="2022-03-19T12:28:53.734" v="3012" actId="20577"/>
-          <ac:spMkLst>
-            <pc:docMk/>
-            <pc:sldMk cId="2720162074" sldId="774"/>
-            <ac:spMk id="49" creationId="{27CFA618-9750-4DBB-B843-DB91CF5BB07C}"/>
-          </ac:spMkLst>
-        </pc:spChg>
-        <pc:spChg chg="mod">
-          <ac:chgData name="Gerth Stølting Brodal" userId="04ef4784-6591-4f86-a140-f5c3b108582a" providerId="ADAL" clId="{6582DE44-CBB2-4155-94EA-6873D72B1ACF}" dt="2022-03-19T11:09:48.226" v="2809" actId="6549"/>
-          <ac:spMkLst>
-            <pc:docMk/>
-            <pc:sldMk cId="2720162074" sldId="774"/>
-            <ac:spMk id="52" creationId="{B89159AD-BC7A-4565-B1DF-EC3885C162D4}"/>
-          </ac:spMkLst>
-        </pc:spChg>
-        <pc:graphicFrameChg chg="mod modGraphic">
-          <ac:chgData name="Gerth Stølting Brodal" userId="04ef4784-6591-4f86-a140-f5c3b108582a" providerId="ADAL" clId="{6582DE44-CBB2-4155-94EA-6873D72B1ACF}" dt="2022-03-19T12:30:23.438" v="3013" actId="207"/>
-          <ac:graphicFrameMkLst>
-            <pc:docMk/>
-            <pc:sldMk cId="2720162074" sldId="774"/>
-            <ac:graphicFrameMk id="8" creationId="{FEFCB115-AB53-4C2D-B305-0CACDAB2540B}"/>
-          </ac:graphicFrameMkLst>
-        </pc:graphicFrameChg>
-        <pc:picChg chg="del">
-          <ac:chgData name="Gerth Stølting Brodal" userId="04ef4784-6591-4f86-a140-f5c3b108582a" providerId="ADAL" clId="{6582DE44-CBB2-4155-94EA-6873D72B1ACF}" dt="2022-03-19T11:23:01.428" v="2984" actId="478"/>
-          <ac:picMkLst>
-            <pc:docMk/>
-            <pc:sldMk cId="2720162074" sldId="774"/>
-            <ac:picMk id="4" creationId="{01C62DF3-A7AA-4692-8340-004ECB98DBCE}"/>
-          </ac:picMkLst>
-        </pc:picChg>
-        <pc:picChg chg="add mod">
-          <ac:chgData name="Gerth Stølting Brodal" userId="04ef4784-6591-4f86-a140-f5c3b108582a" providerId="ADAL" clId="{6582DE44-CBB2-4155-94EA-6873D72B1ACF}" dt="2022-03-19T11:23:42.819" v="3004" actId="1037"/>
-          <ac:picMkLst>
-            <pc:docMk/>
-            <pc:sldMk cId="2720162074" sldId="774"/>
-            <ac:picMk id="15" creationId="{5C3C1E70-8A85-427F-ACE8-F70A99E01894}"/>
-          </ac:picMkLst>
-        </pc:picChg>
-        <pc:cxnChg chg="add del mod">
-          <ac:chgData name="Gerth Stølting Brodal" userId="04ef4784-6591-4f86-a140-f5c3b108582a" providerId="ADAL" clId="{6582DE44-CBB2-4155-94EA-6873D72B1ACF}" dt="2022-03-19T11:12:33.379" v="2818" actId="478"/>
-          <ac:cxnSpMkLst>
-            <pc:docMk/>
-            <pc:sldMk cId="2720162074" sldId="774"/>
-            <ac:cxnSpMk id="21" creationId="{92585E37-B695-423E-82C0-A5ECA20A2A36}"/>
-          </ac:cxnSpMkLst>
-        </pc:cxnChg>
-        <pc:cxnChg chg="mod">
-          <ac:chgData name="Gerth Stølting Brodal" userId="04ef4784-6591-4f86-a140-f5c3b108582a" providerId="ADAL" clId="{6582DE44-CBB2-4155-94EA-6873D72B1ACF}" dt="2022-03-19T10:49:55.446" v="2618" actId="1036"/>
-          <ac:cxnSpMkLst>
-            <pc:docMk/>
-            <pc:sldMk cId="2720162074" sldId="774"/>
-            <ac:cxnSpMk id="32" creationId="{7765C4BC-0DBE-4CAE-9029-78ED3968197E}"/>
-          </ac:cxnSpMkLst>
-        </pc:cxnChg>
-        <pc:cxnChg chg="mod">
-          <ac:chgData name="Gerth Stølting Brodal" userId="04ef4784-6591-4f86-a140-f5c3b108582a" providerId="ADAL" clId="{6582DE44-CBB2-4155-94EA-6873D72B1ACF}" dt="2022-03-19T10:49:25.185" v="2592" actId="1076"/>
-          <ac:cxnSpMkLst>
-            <pc:docMk/>
-            <pc:sldMk cId="2720162074" sldId="774"/>
-            <ac:cxnSpMk id="36" creationId="{F7F0AF67-EEA6-41B9-BDF4-FCC9482FF1ED}"/>
-          </ac:cxnSpMkLst>
-        </pc:cxnChg>
-        <pc:cxnChg chg="mod">
-          <ac:chgData name="Gerth Stølting Brodal" userId="04ef4784-6591-4f86-a140-f5c3b108582a" providerId="ADAL" clId="{6582DE44-CBB2-4155-94EA-6873D72B1ACF}" dt="2022-03-19T10:50:07.416" v="2620" actId="14100"/>
-          <ac:cxnSpMkLst>
-            <pc:docMk/>
-            <pc:sldMk cId="2720162074" sldId="774"/>
-            <ac:cxnSpMk id="50" creationId="{5573AF38-E2A2-4572-829E-D9383C4B8D26}"/>
-          </ac:cxnSpMkLst>
-        </pc:cxnChg>
-        <pc:cxnChg chg="mod">
-          <ac:chgData name="Gerth Stølting Brodal" userId="04ef4784-6591-4f86-a140-f5c3b108582a" providerId="ADAL" clId="{6582DE44-CBB2-4155-94EA-6873D72B1ACF}" dt="2022-03-19T11:11:20.958" v="2810" actId="14100"/>
-          <ac:cxnSpMkLst>
-            <pc:docMk/>
-            <pc:sldMk cId="2720162074" sldId="774"/>
-            <ac:cxnSpMk id="51" creationId="{07947EBA-9148-4CB5-8DF7-B9F46BC95050}"/>
-          </ac:cxnSpMkLst>
-        </pc:cxnChg>
       </pc:sldChg>
     </pc:docChg>
   </pc:docChgLst>
@@ -1422,14 +476,6 @@
           <pc:docMk/>
           <pc:sldMk cId="1333584684" sldId="766"/>
         </pc:sldMkLst>
-        <pc:spChg chg="mod">
-          <ac:chgData name="Gerth Stølting Brodal" userId="04ef4784-6591-4f86-a140-f5c3b108582a" providerId="ADAL" clId="{8FD47DEE-5086-479D-B5CD-3F2A274EE952}" dt="2021-04-14T09:46:01.380" v="4" actId="20577"/>
-          <ac:spMkLst>
-            <pc:docMk/>
-            <pc:sldMk cId="1333584684" sldId="766"/>
-            <ac:spMk id="3" creationId="{00000000-0000-0000-0000-000000000000}"/>
-          </ac:spMkLst>
-        </pc:spChg>
       </pc:sldChg>
     </pc:docChg>
   </pc:docChgLst>
@@ -1446,14 +492,6 @@
           <pc:docMk/>
           <pc:sldMk cId="2195625844" sldId="742"/>
         </pc:sldMkLst>
-        <pc:graphicFrameChg chg="modGraphic">
-          <ac:chgData name="Gerth Stølting Brodal" userId="04ef4784-6591-4f86-a140-f5c3b108582a" providerId="ADAL" clId="{15D7ACD7-1346-459B-961E-1F8D8C80D6DB}" dt="2023-03-10T23:59:55.021" v="47" actId="313"/>
-          <ac:graphicFrameMkLst>
-            <pc:docMk/>
-            <pc:sldMk cId="2195625844" sldId="742"/>
-            <ac:graphicFrameMk id="4" creationId="{00000000-0000-0000-0000-000000000000}"/>
-          </ac:graphicFrameMkLst>
-        </pc:graphicFrameChg>
       </pc:sldChg>
       <pc:sldChg chg="modSp mod">
         <pc:chgData name="Gerth Stølting Brodal" userId="04ef4784-6591-4f86-a140-f5c3b108582a" providerId="ADAL" clId="{15D7ACD7-1346-459B-961E-1F8D8C80D6DB}" dt="2023-03-10T23:59:21.033" v="23" actId="20577"/>
@@ -1461,14 +499,6 @@
           <pc:docMk/>
           <pc:sldMk cId="3517907610" sldId="765"/>
         </pc:sldMkLst>
-        <pc:graphicFrameChg chg="modGraphic">
-          <ac:chgData name="Gerth Stølting Brodal" userId="04ef4784-6591-4f86-a140-f5c3b108582a" providerId="ADAL" clId="{15D7ACD7-1346-459B-961E-1F8D8C80D6DB}" dt="2023-03-10T23:59:21.033" v="23" actId="20577"/>
-          <ac:graphicFrameMkLst>
-            <pc:docMk/>
-            <pc:sldMk cId="3517907610" sldId="765"/>
-            <ac:graphicFrameMk id="5" creationId="{00000000-0000-0000-0000-000000000000}"/>
-          </ac:graphicFrameMkLst>
-        </pc:graphicFrameChg>
       </pc:sldChg>
     </pc:docChg>
   </pc:docChgLst>
@@ -1573,7 +603,7 @@
           <a:p>
             <a:fld id="{FB1A172F-81D4-4DC4-9113-1DBD56EC3646}" type="datetimeFigureOut">
               <a:rPr lang="en-US" smtClean="0"/>
-              <a:t>4/10/2024</a:t>
+              <a:t>3/26/2025</a:t>
             </a:fld>
             <a:endParaRPr lang="en-US"/>
           </a:p>
@@ -4844,6 +3874,81 @@
           <a:bodyPr/>
           <a:lstStyle/>
           <a:p>
+            <a:pPr marL="0" marR="0" lvl="0" indent="0" algn="l" defTabSz="914400" rtl="0" eaLnBrk="1" fontAlgn="auto" latinLnBrk="0" hangingPunct="1">
+              <a:lnSpc>
+                <a:spcPct val="100000"/>
+              </a:lnSpc>
+              <a:spcBef>
+                <a:spcPts val="0"/>
+              </a:spcBef>
+              <a:spcAft>
+                <a:spcPts val="0"/>
+              </a:spcAft>
+              <a:buClrTx/>
+              <a:buSzTx/>
+              <a:buFontTx/>
+              <a:buNone/>
+              <a:tabLst/>
+              <a:defRPr/>
+            </a:pPr>
+            <a:r>
+              <a:rPr lang="da-DK" b="0" dirty="0" err="1"/>
+              <a:t>Until</a:t>
+            </a:r>
+            <a:r>
+              <a:rPr lang="da-DK" b="0" dirty="0"/>
+              <a:t> </a:t>
+            </a:r>
+            <a:r>
+              <a:rPr lang="da-DK" b="0" dirty="0" err="1"/>
+              <a:t>numpy</a:t>
+            </a:r>
+            <a:r>
+              <a:rPr lang="da-DK" b="0" dirty="0"/>
+              <a:t> Version 2.0 </a:t>
+            </a:r>
+            <a:r>
+              <a:rPr lang="da-DK" b="0" dirty="0" err="1"/>
+              <a:t>one</a:t>
+            </a:r>
+            <a:r>
+              <a:rPr lang="da-DK" b="0" dirty="0"/>
+              <a:t> </a:t>
+            </a:r>
+            <a:r>
+              <a:rPr lang="da-DK" b="0" dirty="0" err="1"/>
+              <a:t>could</a:t>
+            </a:r>
+            <a:r>
+              <a:rPr lang="da-DK" b="0" dirty="0"/>
+              <a:t> </a:t>
+            </a:r>
+            <a:r>
+              <a:rPr lang="da-DK" b="0" dirty="0" err="1"/>
+              <a:t>use</a:t>
+            </a:r>
+            <a:r>
+              <a:rPr lang="da-DK" b="0" dirty="0"/>
+              <a:t> </a:t>
+            </a:r>
+            <a:r>
+              <a:rPr lang="da-DK" b="0" dirty="0" err="1"/>
+              <a:t>np</a:t>
+            </a:r>
+            <a:r>
+              <a:rPr lang="da-DK" b="0" dirty="0"/>
+              <a:t>.</a:t>
+            </a:r>
+            <a:r>
+              <a:rPr lang="en-US" b="0" dirty="0" err="1"/>
+              <a:t>sctypes</a:t>
+            </a:r>
+            <a:r>
+              <a:rPr lang="en-US" b="0" dirty="0"/>
+              <a:t> to get all types</a:t>
+            </a:r>
+          </a:p>
+          <a:p>
             <a:endParaRPr lang="en-US" b="1" dirty="0"/>
           </a:p>
         </p:txBody>
@@ -5344,7 +4449,7 @@
           <a:p>
             <a:fld id="{0560A9CD-0304-4E0B-9E82-E7E0115DE05B}" type="datetimeFigureOut">
               <a:rPr lang="en-US" smtClean="0"/>
-              <a:t>4/10/2024</a:t>
+              <a:t>3/26/2025</a:t>
             </a:fld>
             <a:endParaRPr lang="en-US"/>
           </a:p>
@@ -5512,7 +4617,7 @@
           <a:p>
             <a:fld id="{0560A9CD-0304-4E0B-9E82-E7E0115DE05B}" type="datetimeFigureOut">
               <a:rPr lang="en-US" smtClean="0"/>
-              <a:t>4/10/2024</a:t>
+              <a:t>3/26/2025</a:t>
             </a:fld>
             <a:endParaRPr lang="en-US"/>
           </a:p>
@@ -5690,7 +4795,7 @@
           <a:p>
             <a:fld id="{0560A9CD-0304-4E0B-9E82-E7E0115DE05B}" type="datetimeFigureOut">
               <a:rPr lang="en-US" smtClean="0"/>
-              <a:t>4/10/2024</a:t>
+              <a:t>3/26/2025</a:t>
             </a:fld>
             <a:endParaRPr lang="en-US"/>
           </a:p>
@@ -5873,7 +4978,7 @@
           <a:p>
             <a:fld id="{0560A9CD-0304-4E0B-9E82-E7E0115DE05B}" type="datetimeFigureOut">
               <a:rPr lang="en-US" smtClean="0"/>
-              <a:t>4/10/2024</a:t>
+              <a:t>3/26/2025</a:t>
             </a:fld>
             <a:endParaRPr lang="en-US"/>
           </a:p>
@@ -6118,7 +5223,7 @@
           <a:p>
             <a:fld id="{0560A9CD-0304-4E0B-9E82-E7E0115DE05B}" type="datetimeFigureOut">
               <a:rPr lang="en-US" smtClean="0"/>
-              <a:t>4/10/2024</a:t>
+              <a:t>3/26/2025</a:t>
             </a:fld>
             <a:endParaRPr lang="en-US"/>
           </a:p>
@@ -6347,7 +5452,7 @@
           <a:p>
             <a:fld id="{0560A9CD-0304-4E0B-9E82-E7E0115DE05B}" type="datetimeFigureOut">
               <a:rPr lang="en-US" smtClean="0"/>
-              <a:t>4/10/2024</a:t>
+              <a:t>3/26/2025</a:t>
             </a:fld>
             <a:endParaRPr lang="en-US"/>
           </a:p>
@@ -6711,7 +5816,7 @@
           <a:p>
             <a:fld id="{0560A9CD-0304-4E0B-9E82-E7E0115DE05B}" type="datetimeFigureOut">
               <a:rPr lang="en-US" smtClean="0"/>
-              <a:t>4/10/2024</a:t>
+              <a:t>3/26/2025</a:t>
             </a:fld>
             <a:endParaRPr lang="en-US"/>
           </a:p>
@@ -6828,7 +5933,7 @@
           <a:p>
             <a:fld id="{0560A9CD-0304-4E0B-9E82-E7E0115DE05B}" type="datetimeFigureOut">
               <a:rPr lang="en-US" smtClean="0"/>
-              <a:t>4/10/2024</a:t>
+              <a:t>3/26/2025</a:t>
             </a:fld>
             <a:endParaRPr lang="en-US"/>
           </a:p>
@@ -6923,7 +6028,7 @@
           <a:p>
             <a:fld id="{0560A9CD-0304-4E0B-9E82-E7E0115DE05B}" type="datetimeFigureOut">
               <a:rPr lang="en-US" smtClean="0"/>
-              <a:t>4/10/2024</a:t>
+              <a:t>3/26/2025</a:t>
             </a:fld>
             <a:endParaRPr lang="en-US"/>
           </a:p>
@@ -7198,7 +6303,7 @@
           <a:p>
             <a:fld id="{0560A9CD-0304-4E0B-9E82-E7E0115DE05B}" type="datetimeFigureOut">
               <a:rPr lang="en-US" smtClean="0"/>
-              <a:t>4/10/2024</a:t>
+              <a:t>3/26/2025</a:t>
             </a:fld>
             <a:endParaRPr lang="en-US"/>
           </a:p>
@@ -7450,7 +6555,7 @@
           <a:p>
             <a:fld id="{0560A9CD-0304-4E0B-9E82-E7E0115DE05B}" type="datetimeFigureOut">
               <a:rPr lang="en-US" smtClean="0"/>
-              <a:t>4/10/2024</a:t>
+              <a:t>3/26/2025</a:t>
             </a:fld>
             <a:endParaRPr lang="en-US"/>
           </a:p>
@@ -7661,7 +6766,7 @@
           <a:p>
             <a:fld id="{0560A9CD-0304-4E0B-9E82-E7E0115DE05B}" type="datetimeFigureOut">
               <a:rPr lang="en-US" smtClean="0"/>
-              <a:t>4/10/2024</a:t>
+              <a:t>3/26/2025</a:t>
             </a:fld>
             <a:endParaRPr lang="en-US"/>
           </a:p>
@@ -21023,14 +20128,14 @@
           <p:nvPr>
             <p:extLst>
               <p:ext uri="{D42A27DB-BD31-4B8C-83A1-F6EECF244321}">
-                <p14:modId xmlns:p14="http://schemas.microsoft.com/office/powerpoint/2010/main" val="4076853759"/>
+                <p14:modId xmlns:p14="http://schemas.microsoft.com/office/powerpoint/2010/main" val="2928263866"/>
               </p:ext>
             </p:extLst>
           </p:nvPr>
         </p:nvGraphicFramePr>
         <p:xfrm>
-          <a:off x="385470" y="3279052"/>
-          <a:ext cx="5407660" cy="3188570"/>
+          <a:off x="385470" y="3188678"/>
+          <a:ext cx="5407660" cy="3210944"/>
         </p:xfrm>
         <a:graphic>
           <a:graphicData uri="http://schemas.openxmlformats.org/drawingml/2006/table">
@@ -21054,7 +20159,7 @@
                   </a:extLst>
                 </a:gridCol>
               </a:tblGrid>
-              <a:tr h="318857">
+              <a:tr h="291904">
                 <a:tc>
                   <a:txBody>
                     <a:bodyPr/>
@@ -21147,7 +20252,7 @@
                   </a:ext>
                 </a:extLst>
               </a:tr>
-              <a:tr h="318857">
+              <a:tr h="291904">
                 <a:tc>
                   <a:txBody>
                     <a:bodyPr/>
@@ -21222,7 +20327,7 @@
                   </a:ext>
                 </a:extLst>
               </a:tr>
-              <a:tr h="318857">
+              <a:tr h="291904">
                 <a:tc>
                   <a:txBody>
                     <a:bodyPr/>
@@ -21302,7 +20407,7 @@
                   </a:ext>
                 </a:extLst>
               </a:tr>
-              <a:tr h="318857">
+              <a:tr h="291904">
                 <a:tc>
                   <a:txBody>
                     <a:bodyPr/>
@@ -21393,7 +20498,7 @@
                   </a:ext>
                 </a:extLst>
               </a:tr>
-              <a:tr h="318857">
+              <a:tr h="291904">
                 <a:tc>
                   <a:txBody>
                     <a:bodyPr/>
@@ -21484,7 +20589,7 @@
                   </a:ext>
                 </a:extLst>
               </a:tr>
-              <a:tr h="318857">
+              <a:tr h="291904">
                 <a:tc>
                   <a:txBody>
                     <a:bodyPr/>
@@ -21575,7 +20680,7 @@
                   </a:ext>
                 </a:extLst>
               </a:tr>
-              <a:tr h="318857">
+              <a:tr h="291904">
                 <a:tc>
                   <a:txBody>
                     <a:bodyPr/>
@@ -21666,7 +20771,99 @@
                   </a:ext>
                 </a:extLst>
               </a:tr>
-              <a:tr h="318857">
+              <a:tr h="291904">
+                <a:tc>
+                  <a:txBody>
+                    <a:bodyPr/>
+                    <a:lstStyle/>
+                    <a:p>
+                      <a:pPr marL="0" marR="0" lvl="0" indent="0" algn="ctr" defTabSz="914400" rtl="0" eaLnBrk="1" fontAlgn="auto" latinLnBrk="0" hangingPunct="1">
+                        <a:lnSpc>
+                          <a:spcPct val="100000"/>
+                        </a:lnSpc>
+                        <a:spcBef>
+                          <a:spcPts val="0"/>
+                        </a:spcBef>
+                        <a:spcAft>
+                          <a:spcPts val="0"/>
+                        </a:spcAft>
+                        <a:buClrTx/>
+                        <a:buSzTx/>
+                        <a:buFontTx/>
+                        <a:buNone/>
+                        <a:tabLst/>
+                        <a:defRPr/>
+                      </a:pPr>
+                      <a:r>
+                        <a:rPr lang="en-US" dirty="0">
+                          <a:solidFill>
+                            <a:srgbClr val="C00000"/>
+                          </a:solidFill>
+                        </a:rPr>
+                        <a:t>0</a:t>
+                      </a:r>
+                      <a:r>
+                        <a:rPr lang="en-US" dirty="0"/>
+                        <a:t>0000000000000000000000000000010</a:t>
+                      </a:r>
+                    </a:p>
+                  </a:txBody>
+                  <a:tcPr marL="0" marR="0" marT="0" marB="0">
+                    <a:lnL w="12700" cap="flat" cmpd="sng" algn="ctr">
+                      <a:solidFill>
+                        <a:schemeClr val="tx1"/>
+                      </a:solidFill>
+                      <a:prstDash val="solid"/>
+                      <a:round/>
+                      <a:headEnd type="none" w="med" len="med"/>
+                      <a:tailEnd type="none" w="med" len="med"/>
+                    </a:lnL>
+                    <a:solidFill>
+                      <a:schemeClr val="accent1">
+                        <a:lumMod val="20000"/>
+                        <a:lumOff val="80000"/>
+                      </a:schemeClr>
+                    </a:solidFill>
+                  </a:tcPr>
+                </a:tc>
+                <a:tc>
+                  <a:txBody>
+                    <a:bodyPr/>
+                    <a:lstStyle/>
+                    <a:p>
+                      <a:pPr algn="ctr"/>
+                      <a:r>
+                        <a:rPr lang="da-DK" dirty="0"/>
+                        <a:t>2</a:t>
+                      </a:r>
+                      <a:endParaRPr lang="en-US" dirty="0"/>
+                    </a:p>
+                  </a:txBody>
+                  <a:tcPr marL="0" marR="0" marT="0" marB="0">
+                    <a:lnR w="12700" cap="flat" cmpd="sng" algn="ctr">
+                      <a:solidFill>
+                        <a:schemeClr val="tx1"/>
+                      </a:solidFill>
+                      <a:prstDash val="solid"/>
+                      <a:round/>
+                      <a:headEnd type="none" w="med" len="med"/>
+                      <a:tailEnd type="none" w="med" len="med"/>
+                    </a:lnR>
+                    <a:solidFill>
+                      <a:schemeClr val="accent1">
+                        <a:lumMod val="20000"/>
+                        <a:lumOff val="80000"/>
+                      </a:schemeClr>
+                    </a:solidFill>
+                  </a:tcPr>
+                </a:tc>
+                <a:extLst>
+                  <a:ext uri="{0D108BD9-81ED-4DB2-BD59-A6C34878D82A}">
+                    <a16:rowId xmlns:a16="http://schemas.microsoft.com/office/drawing/2014/main" val="4094232554"/>
+                  </a:ext>
+                </a:extLst>
+              </a:tr>
+              <a:tr h="291904">
                 <a:tc>
                   <a:txBody>
                     <a:bodyPr/>
@@ -21730,7 +20927,7 @@
                   </a:ext>
                 </a:extLst>
               </a:tr>
-              <a:tr h="318857">
+              <a:tr h="291904">
                 <a:tc>
                   <a:txBody>
                     <a:bodyPr/>
@@ -21821,7 +21018,7 @@
                   </a:ext>
                 </a:extLst>
               </a:tr>
-              <a:tr h="318857">
+              <a:tr h="291904">
                 <a:tc>
                   <a:txBody>
                     <a:bodyPr/>
@@ -40838,7 +40035,7 @@
           <p:nvPr>
             <p:extLst>
               <p:ext uri="{D42A27DB-BD31-4B8C-83A1-F6EECF244321}">
-                <p14:modId xmlns:p14="http://schemas.microsoft.com/office/powerpoint/2010/main" val="1433385590"/>
+                <p14:modId xmlns:p14="http://schemas.microsoft.com/office/powerpoint/2010/main" val="1377297701"/>
               </p:ext>
             </p:extLst>
           </p:nvPr>
@@ -42463,6 +41660,87 @@
           </a:prstGeom>
         </p:spPr>
       </p:pic>
+      <p:pic>
+        <p:nvPicPr>
+          <p:cNvPr id="3" name="Picture 2">
+            <a:extLst>
+              <a:ext uri="{FF2B5EF4-FFF2-40B4-BE49-F238E27FC236}">
+                <a16:creationId xmlns:a16="http://schemas.microsoft.com/office/drawing/2014/main" id="{DC2D2D41-C5E8-9710-8570-8CC2097A8D39}"/>
+              </a:ext>
+            </a:extLst>
+          </p:cNvPr>
+          <p:cNvPicPr>
+            <a:picLocks noChangeAspect="1"/>
+          </p:cNvPicPr>
+          <p:nvPr/>
+        </p:nvPicPr>
+        <p:blipFill>
+          <a:blip r:embed="rId3" cstate="print">
+            <a:extLst>
+              <a:ext uri="{28A0092B-C50C-407E-A947-70E740481C1C}">
+                <a14:useLocalDpi xmlns:a14="http://schemas.microsoft.com/office/drawing/2010/main" val="0"/>
+              </a:ext>
+            </a:extLst>
+          </a:blip>
+          <a:stretch>
+            <a:fillRect/>
+          </a:stretch>
+        </p:blipFill>
+        <p:spPr>
+          <a:xfrm>
+            <a:off x="11583949" y="4658413"/>
+            <a:ext cx="487666" cy="405904"/>
+          </a:xfrm>
+          <a:prstGeom prst="rect">
+            <a:avLst/>
+          </a:prstGeom>
+        </p:spPr>
+      </p:pic>
+      <p:sp>
+        <p:nvSpPr>
+          <p:cNvPr id="9" name="TextBox 8">
+            <a:extLst>
+              <a:ext uri="{FF2B5EF4-FFF2-40B4-BE49-F238E27FC236}">
+                <a16:creationId xmlns:a16="http://schemas.microsoft.com/office/drawing/2014/main" id="{CF633ABE-04BB-BEA3-2AB1-AB1DF2823887}"/>
+              </a:ext>
+            </a:extLst>
+          </p:cNvPr>
+          <p:cNvSpPr txBox="1"/>
+          <p:nvPr/>
+        </p:nvSpPr>
+        <p:spPr>
+          <a:xfrm>
+            <a:off x="11486271" y="4986905"/>
+            <a:ext cx="670560" cy="369332"/>
+          </a:xfrm>
+          <a:prstGeom prst="rect">
+            <a:avLst/>
+          </a:prstGeom>
+          <a:noFill/>
+        </p:spPr>
+        <p:txBody>
+          <a:bodyPr wrap="square" rtlCol="0">
+            <a:spAutoFit/>
+          </a:bodyPr>
+          <a:lstStyle/>
+          <a:p>
+            <a:pPr algn="ctr"/>
+            <a:r>
+              <a:rPr lang="da-DK" dirty="0" err="1">
+                <a:solidFill>
+                  <a:srgbClr val="C00000"/>
+                </a:solidFill>
+              </a:rPr>
+              <a:t>slow</a:t>
+            </a:r>
+            <a:endParaRPr lang="da-DK" dirty="0">
+              <a:solidFill>
+                <a:srgbClr val="C00000"/>
+              </a:solidFill>
+            </a:endParaRPr>
+          </a:p>
+        </p:txBody>
+      </p:sp>
     </p:spTree>
     <p:extLst>
       <p:ext uri="{BB962C8B-B14F-4D97-AF65-F5344CB8AC3E}">
@@ -42538,14 +41816,14 @@
           <p:nvPr>
             <p:extLst>
               <p:ext uri="{D42A27DB-BD31-4B8C-83A1-F6EECF244321}">
-                <p14:modId xmlns:p14="http://schemas.microsoft.com/office/powerpoint/2010/main" val="2045099847"/>
+                <p14:modId xmlns:p14="http://schemas.microsoft.com/office/powerpoint/2010/main" val="3036145987"/>
               </p:ext>
             </p:extLst>
           </p:nvPr>
         </p:nvGraphicFramePr>
         <p:xfrm>
           <a:off x="703790" y="2685144"/>
-          <a:ext cx="10784420" cy="3514410"/>
+          <a:ext cx="10784420" cy="2965770"/>
         </p:xfrm>
         <a:graphic>
           <a:graphicData uri="http://schemas.openxmlformats.org/drawingml/2006/table">
@@ -42684,20 +41962,13 @@
                       </a:pPr>
                       <a:r>
                         <a:rPr lang="pt-BR" sz="1800" b="1" baseline="0" dirty="0">
-                          <a:latin typeface="Courier New" panose="02070309020205020404" pitchFamily="49" charset="0"/>
-                          <a:cs typeface="Courier New" panose="02070309020205020404" pitchFamily="49" charset="0"/>
-                        </a:rPr>
-                        <a:t>np.</a:t>
-                      </a:r>
-                      <a:r>
-                        <a:rPr lang="pt-BR" sz="1800" b="1" baseline="0" dirty="0">
                           <a:solidFill>
                             <a:srgbClr val="C00000"/>
                           </a:solidFill>
                           <a:latin typeface="Courier New" panose="02070309020205020404" pitchFamily="49" charset="0"/>
                           <a:cs typeface="Courier New" panose="02070309020205020404" pitchFamily="49" charset="0"/>
                         </a:rPr>
-                        <a:t>sctypes</a:t>
+                        <a:t>list(np.sctypeDict)</a:t>
                       </a:r>
                     </a:p>
                     <a:p>
@@ -42716,111 +41987,7 @@
                           <a:latin typeface="Courier New" panose="02070309020205020404" pitchFamily="49" charset="0"/>
                           <a:cs typeface="Courier New" panose="02070309020205020404" pitchFamily="49" charset="0"/>
                         </a:rPr>
-                        <a:t>{'int':    [&lt;class 'numpy.int8'&gt;, &lt;class 'numpy.int16'&gt;,</a:t>
-                      </a:r>
-                      <a:br>
-                        <a:rPr lang="pt-BR" sz="1800" b="1" baseline="0" dirty="0">
-                          <a:latin typeface="Courier New" panose="02070309020205020404" pitchFamily="49" charset="0"/>
-                          <a:cs typeface="Courier New" panose="02070309020205020404" pitchFamily="49" charset="0"/>
-                        </a:rPr>
-                      </a:br>
-                      <a:r>
-                        <a:rPr lang="pt-BR" sz="1800" b="1" baseline="0" dirty="0">
-                          <a:latin typeface="Courier New" panose="02070309020205020404" pitchFamily="49" charset="0"/>
-                          <a:cs typeface="Courier New" panose="02070309020205020404" pitchFamily="49" charset="0"/>
-                        </a:rPr>
-                        <a:t>            &lt;class 'numpy.int32'&gt;, &lt;class 'numpy.int64'&gt;], </a:t>
-                      </a:r>
-                      <a:br>
-                        <a:rPr lang="pt-BR" sz="1800" b="1" baseline="0" dirty="0">
-                          <a:latin typeface="Courier New" panose="02070309020205020404" pitchFamily="49" charset="0"/>
-                          <a:cs typeface="Courier New" panose="02070309020205020404" pitchFamily="49" charset="0"/>
-                        </a:rPr>
-                      </a:br>
-                      <a:r>
-                        <a:rPr lang="pt-BR" sz="1800" b="1" baseline="0" dirty="0">
-                          <a:latin typeface="Courier New" panose="02070309020205020404" pitchFamily="49" charset="0"/>
-                          <a:cs typeface="Courier New" panose="02070309020205020404" pitchFamily="49" charset="0"/>
-                        </a:rPr>
-                        <a:t>'uint':    [&lt;class 'numpy.uint8'&gt;, &lt;class 'numpy.uint16'&gt;, </a:t>
-                      </a:r>
-                      <a:br>
-                        <a:rPr lang="pt-BR" sz="1800" b="1" baseline="0" dirty="0">
-                          <a:latin typeface="Courier New" panose="02070309020205020404" pitchFamily="49" charset="0"/>
-                          <a:cs typeface="Courier New" panose="02070309020205020404" pitchFamily="49" charset="0"/>
-                        </a:rPr>
-                      </a:br>
-                      <a:r>
-                        <a:rPr lang="pt-BR" sz="1800" b="1" baseline="0" dirty="0">
-                          <a:latin typeface="Courier New" panose="02070309020205020404" pitchFamily="49" charset="0"/>
-                          <a:cs typeface="Courier New" panose="02070309020205020404" pitchFamily="49" charset="0"/>
-                        </a:rPr>
-                        <a:t>            &lt;class 'numpy.uint32'&gt;, &lt;class 'numpy.uint64'&gt;], </a:t>
-                      </a:r>
-                      <a:br>
-                        <a:rPr lang="pt-BR" sz="1800" b="1" baseline="0" dirty="0">
-                          <a:latin typeface="Courier New" panose="02070309020205020404" pitchFamily="49" charset="0"/>
-                          <a:cs typeface="Courier New" panose="02070309020205020404" pitchFamily="49" charset="0"/>
-                        </a:rPr>
-                      </a:br>
-                      <a:r>
-                        <a:rPr lang="pt-BR" sz="1800" b="1" baseline="0" dirty="0">
-                          <a:latin typeface="Courier New" panose="02070309020205020404" pitchFamily="49" charset="0"/>
-                          <a:cs typeface="Courier New" panose="02070309020205020404" pitchFamily="49" charset="0"/>
-                        </a:rPr>
-                        <a:t>'float':   [&lt;class 'numpy.float16'&gt;, &lt;class 'numpy.float32'&gt;, </a:t>
-                      </a:r>
-                      <a:br>
-                        <a:rPr lang="pt-BR" sz="1800" b="1" baseline="0" dirty="0">
-                          <a:latin typeface="Courier New" panose="02070309020205020404" pitchFamily="49" charset="0"/>
-                          <a:cs typeface="Courier New" panose="02070309020205020404" pitchFamily="49" charset="0"/>
-                        </a:rPr>
-                      </a:br>
-                      <a:r>
-                        <a:rPr lang="pt-BR" sz="1800" b="1" baseline="0" dirty="0">
-                          <a:latin typeface="Courier New" panose="02070309020205020404" pitchFamily="49" charset="0"/>
-                          <a:cs typeface="Courier New" panose="02070309020205020404" pitchFamily="49" charset="0"/>
-                        </a:rPr>
-                        <a:t>            &lt;class 'numpy.float64'&gt;], </a:t>
-                      </a:r>
-                      <a:br>
-                        <a:rPr lang="pt-BR" sz="1800" b="1" baseline="0" dirty="0">
-                          <a:latin typeface="Courier New" panose="02070309020205020404" pitchFamily="49" charset="0"/>
-                          <a:cs typeface="Courier New" panose="02070309020205020404" pitchFamily="49" charset="0"/>
-                        </a:rPr>
-                      </a:br>
-                      <a:r>
-                        <a:rPr lang="pt-BR" sz="1800" b="1" baseline="0" dirty="0">
-                          <a:latin typeface="Courier New" panose="02070309020205020404" pitchFamily="49" charset="0"/>
-                          <a:cs typeface="Courier New" panose="02070309020205020404" pitchFamily="49" charset="0"/>
-                        </a:rPr>
-                        <a:t>'complex': [&lt;class 'numpy.complex64'&gt;, &lt;class 'numpy.complex128'&gt;],</a:t>
-                      </a:r>
-                      <a:br>
-                        <a:rPr lang="pt-BR" sz="1800" b="1" baseline="0" dirty="0">
-                          <a:latin typeface="Courier New" panose="02070309020205020404" pitchFamily="49" charset="0"/>
-                          <a:cs typeface="Courier New" panose="02070309020205020404" pitchFamily="49" charset="0"/>
-                        </a:rPr>
-                      </a:br>
-                      <a:r>
-                        <a:rPr lang="pt-BR" sz="1800" b="1" baseline="0" dirty="0">
-                          <a:latin typeface="Courier New" panose="02070309020205020404" pitchFamily="49" charset="0"/>
-                          <a:cs typeface="Courier New" panose="02070309020205020404" pitchFamily="49" charset="0"/>
-                        </a:rPr>
-                        <a:t>'others':  [&lt;class 'bool'&gt;, &lt;class 'object'&gt;, &lt;class 'bytes'&gt;, </a:t>
-                      </a:r>
-                      <a:br>
-                        <a:rPr lang="pt-BR" sz="1800" b="1" baseline="0" dirty="0">
-                          <a:latin typeface="Courier New" panose="02070309020205020404" pitchFamily="49" charset="0"/>
-                          <a:cs typeface="Courier New" panose="02070309020205020404" pitchFamily="49" charset="0"/>
-                        </a:rPr>
-                      </a:br>
-                      <a:r>
-                        <a:rPr lang="pt-BR" sz="1800" b="1" baseline="0" dirty="0">
-                          <a:latin typeface="Courier New" panose="02070309020205020404" pitchFamily="49" charset="0"/>
-                          <a:cs typeface="Courier New" panose="02070309020205020404" pitchFamily="49" charset="0"/>
-                        </a:rPr>
-                        <a:t>            &lt;class 'str'&gt;, &lt;class 'numpy.void'&gt;]}</a:t>
+                        <a:t>['bool', 'float16', 'float32', 'float64', 'longdouble', 'complex64', 'complex128', 'clongdouble', 'bytes_', 'str_', 'void', 'object_', 'datetime64', 'timedelta64', 'int8', 'byte', 'uint8', 'ubyte', 'int16', 'short', 'uint16', 'ushort', 'intc', 'uintc', 'int32', 'long', 'uint32', 'ulong', 'int64', 'longlong', 'uint64', 'ulonglong', 'intp', 'uintp', 'double', 'cdouble', 'single', 'csingle', 'half', 'bool_', 'int_', 'uint', 'float', 'complex', 'object', 'bytes', 'a', 'int', 'str', 'unicode']</a:t>
                       </a:r>
                     </a:p>
                   </a:txBody>

</xml_diff>